<commit_message>
Cleaned up _developerTools; + Status Flow diagram
</commit_message>
<xml_diff>
--- a/project management/Status Flow.pptx
+++ b/project management/Status Flow.pptx
@@ -7,6 +7,12 @@
   <p:sldIdLst>
     <p:sldId id="256" r:id="rId2"/>
     <p:sldId id="257" r:id="rId3"/>
+    <p:sldId id="258" r:id="rId4"/>
+    <p:sldId id="263" r:id="rId5"/>
+    <p:sldId id="259" r:id="rId6"/>
+    <p:sldId id="260" r:id="rId7"/>
+    <p:sldId id="261" r:id="rId8"/>
+    <p:sldId id="262" r:id="rId9"/>
   </p:sldIdLst>
   <p:sldSz cx="12192000" cy="6858000"/>
   <p:notesSz cx="6858000" cy="9144000"/>
@@ -116,7 +122,7 @@
 <file path=ppt/revisionInfo.xml><?xml version="1.0" encoding="utf-8"?>
 <p1510:revInfo xmlns:a="http://schemas.openxmlformats.org/drawingml/2006/main" xmlns:r="http://schemas.openxmlformats.org/officeDocument/2006/relationships" xmlns:p1510="http://schemas.microsoft.com/office/powerpoint/2015/10/main">
   <p1510:revLst>
-    <p1510:client id="{71944941-9426-4B12-B3B2-F310EBE78256}" v="309" dt="2020-04-15T18:00:29.523"/>
+    <p1510:client id="{71944941-9426-4B12-B3B2-F310EBE78256}" v="353" dt="2020-04-17T12:16:31.459"/>
   </p1510:revLst>
 </p1510:revInfo>
 </file>
@@ -125,8 +131,8 @@
 <pc:chgInfo xmlns:a="http://schemas.openxmlformats.org/drawingml/2006/main" xmlns:r="http://schemas.openxmlformats.org/officeDocument/2006/relationships" xmlns:ac="http://schemas.microsoft.com/office/drawing/2013/main/command" xmlns:pc="http://schemas.microsoft.com/office/powerpoint/2013/main/command">
   <pc:docChgLst>
     <pc:chgData name="Peter Fison" userId="414d6edd842eada8" providerId="LiveId" clId="{71944941-9426-4B12-B3B2-F310EBE78256}"/>
-    <pc:docChg chg="undo custSel addSld modSld">
-      <pc:chgData name="Peter Fison" userId="414d6edd842eada8" providerId="LiveId" clId="{71944941-9426-4B12-B3B2-F310EBE78256}" dt="2020-04-15T18:00:57.645" v="975" actId="1076"/>
+    <pc:docChg chg="undo custSel addSld modSld sldOrd">
+      <pc:chgData name="Peter Fison" userId="414d6edd842eada8" providerId="LiveId" clId="{71944941-9426-4B12-B3B2-F310EBE78256}" dt="2020-04-17T12:18:56.151" v="1100" actId="478"/>
       <pc:docMkLst>
         <pc:docMk/>
       </pc:docMkLst>
@@ -745,8 +751,8 @@
           </ac:picMkLst>
         </pc:picChg>
       </pc:sldChg>
-      <pc:sldChg chg="addSp delSp modSp add">
-        <pc:chgData name="Peter Fison" userId="414d6edd842eada8" providerId="LiveId" clId="{71944941-9426-4B12-B3B2-F310EBE78256}" dt="2020-04-15T07:54:25.106" v="879" actId="108"/>
+      <pc:sldChg chg="addSp delSp modSp add ord">
+        <pc:chgData name="Peter Fison" userId="414d6edd842eada8" providerId="LiveId" clId="{71944941-9426-4B12-B3B2-F310EBE78256}" dt="2020-04-17T12:08:16.335" v="978"/>
         <pc:sldMkLst>
           <pc:docMk/>
           <pc:sldMk cId="2789593357" sldId="257"/>
@@ -767,6 +773,672 @@
             <ac:graphicFrameMk id="3" creationId="{C7B969AD-E2A1-43FF-99D2-DD70F1CBC88F}"/>
           </ac:graphicFrameMkLst>
         </pc:graphicFrameChg>
+      </pc:sldChg>
+      <pc:sldChg chg="addSp delSp modSp add">
+        <pc:chgData name="Peter Fison" userId="414d6edd842eada8" providerId="LiveId" clId="{71944941-9426-4B12-B3B2-F310EBE78256}" dt="2020-04-17T12:16:37.228" v="1089" actId="478"/>
+        <pc:sldMkLst>
+          <pc:docMk/>
+          <pc:sldMk cId="3658054417" sldId="258"/>
+        </pc:sldMkLst>
+        <pc:spChg chg="add del">
+          <ac:chgData name="Peter Fison" userId="414d6edd842eada8" providerId="LiveId" clId="{71944941-9426-4B12-B3B2-F310EBE78256}" dt="2020-04-17T12:08:31.135" v="980" actId="478"/>
+          <ac:spMkLst>
+            <pc:docMk/>
+            <pc:sldMk cId="3658054417" sldId="258"/>
+            <ac:spMk id="2" creationId="{EB63496B-AB80-4E10-9590-80BD5A84F962}"/>
+          </ac:spMkLst>
+        </pc:spChg>
+        <pc:spChg chg="add del mod">
+          <ac:chgData name="Peter Fison" userId="414d6edd842eada8" providerId="LiveId" clId="{71944941-9426-4B12-B3B2-F310EBE78256}" dt="2020-04-17T12:16:37.228" v="1089" actId="478"/>
+          <ac:spMkLst>
+            <pc:docMk/>
+            <pc:sldMk cId="3658054417" sldId="258"/>
+            <ac:spMk id="4" creationId="{DEE7815F-0A17-4AC7-9053-F30002D8611A}"/>
+          </ac:spMkLst>
+        </pc:spChg>
+        <pc:spChg chg="add del mod">
+          <ac:chgData name="Peter Fison" userId="414d6edd842eada8" providerId="LiveId" clId="{71944941-9426-4B12-B3B2-F310EBE78256}" dt="2020-04-17T12:12:48.447" v="1032" actId="11529"/>
+          <ac:spMkLst>
+            <pc:docMk/>
+            <pc:sldMk cId="3658054417" sldId="258"/>
+            <ac:spMk id="5" creationId="{5D8069D8-4D5D-4EDA-BFBD-7C9482E14A39}"/>
+          </ac:spMkLst>
+        </pc:spChg>
+        <pc:spChg chg="add del mod">
+          <ac:chgData name="Peter Fison" userId="414d6edd842eada8" providerId="LiveId" clId="{71944941-9426-4B12-B3B2-F310EBE78256}" dt="2020-04-17T12:12:46.464" v="1029" actId="767"/>
+          <ac:spMkLst>
+            <pc:docMk/>
+            <pc:sldMk cId="3658054417" sldId="258"/>
+            <ac:spMk id="6" creationId="{3895D022-56AF-461A-80E8-4DAEA97CD6E2}"/>
+          </ac:spMkLst>
+        </pc:spChg>
+        <pc:spChg chg="add del mod">
+          <ac:chgData name="Peter Fison" userId="414d6edd842eada8" providerId="LiveId" clId="{71944941-9426-4B12-B3B2-F310EBE78256}" dt="2020-04-17T12:12:42.879" v="1023"/>
+          <ac:spMkLst>
+            <pc:docMk/>
+            <pc:sldMk cId="3658054417" sldId="258"/>
+            <ac:spMk id="7" creationId="{247A3B02-900B-4E4A-87DD-B9FF26FBFD35}"/>
+          </ac:spMkLst>
+        </pc:spChg>
+        <pc:spChg chg="add del mod">
+          <ac:chgData name="Peter Fison" userId="414d6edd842eada8" providerId="LiveId" clId="{71944941-9426-4B12-B3B2-F310EBE78256}" dt="2020-04-17T12:12:42.879" v="1023"/>
+          <ac:spMkLst>
+            <pc:docMk/>
+            <pc:sldMk cId="3658054417" sldId="258"/>
+            <ac:spMk id="8" creationId="{E4BB9211-C607-47B6-909D-762C4E11429F}"/>
+          </ac:spMkLst>
+        </pc:spChg>
+        <pc:spChg chg="add del mod">
+          <ac:chgData name="Peter Fison" userId="414d6edd842eada8" providerId="LiveId" clId="{71944941-9426-4B12-B3B2-F310EBE78256}" dt="2020-04-17T12:12:42.200" v="1021"/>
+          <ac:spMkLst>
+            <pc:docMk/>
+            <pc:sldMk cId="3658054417" sldId="258"/>
+            <ac:spMk id="9" creationId="{97D04AD6-F752-4EF8-9C1B-FFD75472053A}"/>
+          </ac:spMkLst>
+        </pc:spChg>
+        <pc:spChg chg="add del">
+          <ac:chgData name="Peter Fison" userId="414d6edd842eada8" providerId="LiveId" clId="{71944941-9426-4B12-B3B2-F310EBE78256}" dt="2020-04-17T12:12:42.200" v="1021"/>
+          <ac:spMkLst>
+            <pc:docMk/>
+            <pc:sldMk cId="3658054417" sldId="258"/>
+            <ac:spMk id="10" creationId="{17C3101C-345E-4812-BAA8-09B266545144}"/>
+          </ac:spMkLst>
+        </pc:spChg>
+        <pc:spChg chg="add del mod">
+          <ac:chgData name="Peter Fison" userId="414d6edd842eada8" providerId="LiveId" clId="{71944941-9426-4B12-B3B2-F310EBE78256}" dt="2020-04-17T12:15:05.946" v="1069" actId="478"/>
+          <ac:spMkLst>
+            <pc:docMk/>
+            <pc:sldMk cId="3658054417" sldId="258"/>
+            <ac:spMk id="11" creationId="{9F235783-BA67-41AF-B6F9-058084F515BE}"/>
+          </ac:spMkLst>
+        </pc:spChg>
+        <pc:spChg chg="add del mod">
+          <ac:chgData name="Peter Fison" userId="414d6edd842eada8" providerId="LiveId" clId="{71944941-9426-4B12-B3B2-F310EBE78256}" dt="2020-04-17T12:15:02.050" v="1068" actId="478"/>
+          <ac:spMkLst>
+            <pc:docMk/>
+            <pc:sldMk cId="3658054417" sldId="258"/>
+            <ac:spMk id="12" creationId="{8911EA14-B426-4FC4-BE01-4589E3FE2E2A}"/>
+          </ac:spMkLst>
+        </pc:spChg>
+        <pc:spChg chg="add mod">
+          <ac:chgData name="Peter Fison" userId="414d6edd842eada8" providerId="LiveId" clId="{71944941-9426-4B12-B3B2-F310EBE78256}" dt="2020-04-17T12:13:29.097" v="1043" actId="1076"/>
+          <ac:spMkLst>
+            <pc:docMk/>
+            <pc:sldMk cId="3658054417" sldId="258"/>
+            <ac:spMk id="13" creationId="{4522A89F-F97B-4F6A-94B0-5FE9A1FB1D23}"/>
+          </ac:spMkLst>
+        </pc:spChg>
+        <pc:spChg chg="add mod">
+          <ac:chgData name="Peter Fison" userId="414d6edd842eada8" providerId="LiveId" clId="{71944941-9426-4B12-B3B2-F310EBE78256}" dt="2020-04-17T12:15:09.321" v="1070" actId="20577"/>
+          <ac:spMkLst>
+            <pc:docMk/>
+            <pc:sldMk cId="3658054417" sldId="258"/>
+            <ac:spMk id="14" creationId="{5E883D05-C127-439E-BADC-7BD5BCFDA494}"/>
+          </ac:spMkLst>
+        </pc:spChg>
+        <pc:spChg chg="add del mod">
+          <ac:chgData name="Peter Fison" userId="414d6edd842eada8" providerId="LiveId" clId="{71944941-9426-4B12-B3B2-F310EBE78256}" dt="2020-04-17T12:16:27.270" v="1087" actId="478"/>
+          <ac:spMkLst>
+            <pc:docMk/>
+            <pc:sldMk cId="3658054417" sldId="258"/>
+            <ac:spMk id="15" creationId="{271E799D-DAC3-4260-88FA-B82C7CC7CE62}"/>
+          </ac:spMkLst>
+        </pc:spChg>
+        <pc:spChg chg="add mod">
+          <ac:chgData name="Peter Fison" userId="414d6edd842eada8" providerId="LiveId" clId="{71944941-9426-4B12-B3B2-F310EBE78256}" dt="2020-04-17T12:15:14.322" v="1072" actId="20577"/>
+          <ac:spMkLst>
+            <pc:docMk/>
+            <pc:sldMk cId="3658054417" sldId="258"/>
+            <ac:spMk id="16" creationId="{E69D983C-5372-4028-9D27-B38E2F00FA3A}"/>
+          </ac:spMkLst>
+        </pc:spChg>
+        <pc:spChg chg="add del mod">
+          <ac:chgData name="Peter Fison" userId="414d6edd842eada8" providerId="LiveId" clId="{71944941-9426-4B12-B3B2-F310EBE78256}" dt="2020-04-17T12:16:27.270" v="1087" actId="478"/>
+          <ac:spMkLst>
+            <pc:docMk/>
+            <pc:sldMk cId="3658054417" sldId="258"/>
+            <ac:spMk id="17" creationId="{894FED59-6297-4A0B-8184-E1025053B65C}"/>
+          </ac:spMkLst>
+        </pc:spChg>
+        <pc:spChg chg="add del mod">
+          <ac:chgData name="Peter Fison" userId="414d6edd842eada8" providerId="LiveId" clId="{71944941-9426-4B12-B3B2-F310EBE78256}" dt="2020-04-17T12:16:27.270" v="1087" actId="478"/>
+          <ac:spMkLst>
+            <pc:docMk/>
+            <pc:sldMk cId="3658054417" sldId="258"/>
+            <ac:spMk id="18" creationId="{FC120A03-F157-4622-8479-B4EF0FB4501F}"/>
+          </ac:spMkLst>
+        </pc:spChg>
+        <pc:spChg chg="add del mod">
+          <ac:chgData name="Peter Fison" userId="414d6edd842eada8" providerId="LiveId" clId="{71944941-9426-4B12-B3B2-F310EBE78256}" dt="2020-04-17T12:16:27.270" v="1087" actId="478"/>
+          <ac:spMkLst>
+            <pc:docMk/>
+            <pc:sldMk cId="3658054417" sldId="258"/>
+            <ac:spMk id="19" creationId="{D4E62EE0-DC14-4798-8B63-FC68067FB05B}"/>
+          </ac:spMkLst>
+        </pc:spChg>
+        <pc:spChg chg="add del mod">
+          <ac:chgData name="Peter Fison" userId="414d6edd842eada8" providerId="LiveId" clId="{71944941-9426-4B12-B3B2-F310EBE78256}" dt="2020-04-17T12:16:27.270" v="1087" actId="478"/>
+          <ac:spMkLst>
+            <pc:docMk/>
+            <pc:sldMk cId="3658054417" sldId="258"/>
+            <ac:spMk id="20" creationId="{A8BAA630-889B-4422-A0FF-85D5CE1D4EB3}"/>
+          </ac:spMkLst>
+        </pc:spChg>
+        <pc:spChg chg="add del mod">
+          <ac:chgData name="Peter Fison" userId="414d6edd842eada8" providerId="LiveId" clId="{71944941-9426-4B12-B3B2-F310EBE78256}" dt="2020-04-17T12:16:27.270" v="1087" actId="478"/>
+          <ac:spMkLst>
+            <pc:docMk/>
+            <pc:sldMk cId="3658054417" sldId="258"/>
+            <ac:spMk id="21" creationId="{3A38C5AE-2BCA-4E20-B57E-5B0366467A68}"/>
+          </ac:spMkLst>
+        </pc:spChg>
+        <pc:spChg chg="add del mod">
+          <ac:chgData name="Peter Fison" userId="414d6edd842eada8" providerId="LiveId" clId="{71944941-9426-4B12-B3B2-F310EBE78256}" dt="2020-04-17T12:16:27.270" v="1087" actId="478"/>
+          <ac:spMkLst>
+            <pc:docMk/>
+            <pc:sldMk cId="3658054417" sldId="258"/>
+            <ac:spMk id="22" creationId="{F4EFA36F-B9FA-43E2-ADED-5C4C306769AF}"/>
+          </ac:spMkLst>
+        </pc:spChg>
+        <pc:spChg chg="add mod">
+          <ac:chgData name="Peter Fison" userId="414d6edd842eada8" providerId="LiveId" clId="{71944941-9426-4B12-B3B2-F310EBE78256}" dt="2020-04-17T12:15:37.448" v="1081" actId="20577"/>
+          <ac:spMkLst>
+            <pc:docMk/>
+            <pc:sldMk cId="3658054417" sldId="258"/>
+            <ac:spMk id="23" creationId="{3B612F88-45AB-4651-8C38-DC3115C2832E}"/>
+          </ac:spMkLst>
+        </pc:spChg>
+        <pc:picChg chg="add mod ord">
+          <ac:chgData name="Peter Fison" userId="414d6edd842eada8" providerId="LiveId" clId="{71944941-9426-4B12-B3B2-F310EBE78256}" dt="2020-04-17T12:13:59.702" v="1054" actId="1076"/>
+          <ac:picMkLst>
+            <pc:docMk/>
+            <pc:sldMk cId="3658054417" sldId="258"/>
+            <ac:picMk id="3" creationId="{0394B81F-98EC-485E-A6B6-399C48F209EC}"/>
+          </ac:picMkLst>
+        </pc:picChg>
+      </pc:sldChg>
+      <pc:sldChg chg="addSp delSp modSp add">
+        <pc:chgData name="Peter Fison" userId="414d6edd842eada8" providerId="LiveId" clId="{71944941-9426-4B12-B3B2-F310EBE78256}" dt="2020-04-17T12:17:12.421" v="1094" actId="478"/>
+        <pc:sldMkLst>
+          <pc:docMk/>
+          <pc:sldMk cId="820560306" sldId="259"/>
+        </pc:sldMkLst>
+        <pc:spChg chg="add mod">
+          <ac:chgData name="Peter Fison" userId="414d6edd842eada8" providerId="LiveId" clId="{71944941-9426-4B12-B3B2-F310EBE78256}" dt="2020-04-17T12:09:34.865" v="991" actId="1076"/>
+          <ac:spMkLst>
+            <pc:docMk/>
+            <pc:sldMk cId="820560306" sldId="259"/>
+            <ac:spMk id="4" creationId="{5E083F51-996D-482E-BBD5-51AB8A27351B}"/>
+          </ac:spMkLst>
+        </pc:spChg>
+        <pc:spChg chg="add">
+          <ac:chgData name="Peter Fison" userId="414d6edd842eada8" providerId="LiveId" clId="{71944941-9426-4B12-B3B2-F310EBE78256}" dt="2020-04-17T12:15:47.108" v="1082"/>
+          <ac:spMkLst>
+            <pc:docMk/>
+            <pc:sldMk cId="820560306" sldId="259"/>
+            <ac:spMk id="5" creationId="{0C6C8060-5863-4FFF-96C0-61B0662FD5C6}"/>
+          </ac:spMkLst>
+        </pc:spChg>
+        <pc:spChg chg="add del">
+          <ac:chgData name="Peter Fison" userId="414d6edd842eada8" providerId="LiveId" clId="{71944941-9426-4B12-B3B2-F310EBE78256}" dt="2020-04-17T12:17:04.090" v="1093" actId="478"/>
+          <ac:spMkLst>
+            <pc:docMk/>
+            <pc:sldMk cId="820560306" sldId="259"/>
+            <ac:spMk id="6" creationId="{43538B6D-C5E9-4B5C-B537-26254F539503}"/>
+          </ac:spMkLst>
+        </pc:spChg>
+        <pc:spChg chg="add">
+          <ac:chgData name="Peter Fison" userId="414d6edd842eada8" providerId="LiveId" clId="{71944941-9426-4B12-B3B2-F310EBE78256}" dt="2020-04-17T12:15:47.108" v="1082"/>
+          <ac:spMkLst>
+            <pc:docMk/>
+            <pc:sldMk cId="820560306" sldId="259"/>
+            <ac:spMk id="7" creationId="{1A13DBBF-720D-412A-83E9-C17BCF36689E}"/>
+          </ac:spMkLst>
+        </pc:spChg>
+        <pc:spChg chg="add del">
+          <ac:chgData name="Peter Fison" userId="414d6edd842eada8" providerId="LiveId" clId="{71944941-9426-4B12-B3B2-F310EBE78256}" dt="2020-04-17T12:17:04.090" v="1093" actId="478"/>
+          <ac:spMkLst>
+            <pc:docMk/>
+            <pc:sldMk cId="820560306" sldId="259"/>
+            <ac:spMk id="8" creationId="{CCBD234A-B362-4103-B3DB-5672DE016985}"/>
+          </ac:spMkLst>
+        </pc:spChg>
+        <pc:spChg chg="add">
+          <ac:chgData name="Peter Fison" userId="414d6edd842eada8" providerId="LiveId" clId="{71944941-9426-4B12-B3B2-F310EBE78256}" dt="2020-04-17T12:15:47.108" v="1082"/>
+          <ac:spMkLst>
+            <pc:docMk/>
+            <pc:sldMk cId="820560306" sldId="259"/>
+            <ac:spMk id="9" creationId="{D2793308-9795-443B-BF40-D0EEC65BB88C}"/>
+          </ac:spMkLst>
+        </pc:spChg>
+        <pc:spChg chg="add">
+          <ac:chgData name="Peter Fison" userId="414d6edd842eada8" providerId="LiveId" clId="{71944941-9426-4B12-B3B2-F310EBE78256}" dt="2020-04-17T12:15:47.108" v="1082"/>
+          <ac:spMkLst>
+            <pc:docMk/>
+            <pc:sldMk cId="820560306" sldId="259"/>
+            <ac:spMk id="10" creationId="{FAB29499-4806-4E66-9706-398EC5068AD6}"/>
+          </ac:spMkLst>
+        </pc:spChg>
+        <pc:spChg chg="add">
+          <ac:chgData name="Peter Fison" userId="414d6edd842eada8" providerId="LiveId" clId="{71944941-9426-4B12-B3B2-F310EBE78256}" dt="2020-04-17T12:15:47.108" v="1082"/>
+          <ac:spMkLst>
+            <pc:docMk/>
+            <pc:sldMk cId="820560306" sldId="259"/>
+            <ac:spMk id="11" creationId="{EE4743DD-936E-456C-9ED0-AC23957A23EE}"/>
+          </ac:spMkLst>
+        </pc:spChg>
+        <pc:spChg chg="add del">
+          <ac:chgData name="Peter Fison" userId="414d6edd842eada8" providerId="LiveId" clId="{71944941-9426-4B12-B3B2-F310EBE78256}" dt="2020-04-17T12:17:12.421" v="1094" actId="478"/>
+          <ac:spMkLst>
+            <pc:docMk/>
+            <pc:sldMk cId="820560306" sldId="259"/>
+            <ac:spMk id="12" creationId="{8BB9979E-8374-43F2-BBBA-BB6F3EC17642}"/>
+          </ac:spMkLst>
+        </pc:spChg>
+        <pc:spChg chg="add">
+          <ac:chgData name="Peter Fison" userId="414d6edd842eada8" providerId="LiveId" clId="{71944941-9426-4B12-B3B2-F310EBE78256}" dt="2020-04-17T12:15:47.108" v="1082"/>
+          <ac:spMkLst>
+            <pc:docMk/>
+            <pc:sldMk cId="820560306" sldId="259"/>
+            <ac:spMk id="13" creationId="{35E4BE30-89D8-4C07-AB08-C5D078EB492F}"/>
+          </ac:spMkLst>
+        </pc:spChg>
+        <pc:spChg chg="add del">
+          <ac:chgData name="Peter Fison" userId="414d6edd842eada8" providerId="LiveId" clId="{71944941-9426-4B12-B3B2-F310EBE78256}" dt="2020-04-17T12:17:12.421" v="1094" actId="478"/>
+          <ac:spMkLst>
+            <pc:docMk/>
+            <pc:sldMk cId="820560306" sldId="259"/>
+            <ac:spMk id="14" creationId="{C5140897-3E9E-4472-9C42-9BF59783000D}"/>
+          </ac:spMkLst>
+        </pc:spChg>
+        <pc:spChg chg="add">
+          <ac:chgData name="Peter Fison" userId="414d6edd842eada8" providerId="LiveId" clId="{71944941-9426-4B12-B3B2-F310EBE78256}" dt="2020-04-17T12:15:47.108" v="1082"/>
+          <ac:spMkLst>
+            <pc:docMk/>
+            <pc:sldMk cId="820560306" sldId="259"/>
+            <ac:spMk id="15" creationId="{DF0D4E4A-A370-4613-BE34-A22CE5616CE1}"/>
+          </ac:spMkLst>
+        </pc:spChg>
+        <pc:picChg chg="mod">
+          <ac:chgData name="Peter Fison" userId="414d6edd842eada8" providerId="LiveId" clId="{71944941-9426-4B12-B3B2-F310EBE78256}" dt="2020-04-17T12:17:01.266" v="1092" actId="1076"/>
+          <ac:picMkLst>
+            <pc:docMk/>
+            <pc:sldMk cId="820560306" sldId="259"/>
+            <ac:picMk id="3" creationId="{0394B81F-98EC-485E-A6B6-399C48F209EC}"/>
+          </ac:picMkLst>
+        </pc:picChg>
+      </pc:sldChg>
+      <pc:sldChg chg="addSp delSp modSp add">
+        <pc:chgData name="Peter Fison" userId="414d6edd842eada8" providerId="LiveId" clId="{71944941-9426-4B12-B3B2-F310EBE78256}" dt="2020-04-17T12:17:28.824" v="1096" actId="478"/>
+        <pc:sldMkLst>
+          <pc:docMk/>
+          <pc:sldMk cId="3996105777" sldId="260"/>
+        </pc:sldMkLst>
+        <pc:spChg chg="add mod">
+          <ac:chgData name="Peter Fison" userId="414d6edd842eada8" providerId="LiveId" clId="{71944941-9426-4B12-B3B2-F310EBE78256}" dt="2020-04-17T12:09:42.362" v="993" actId="1076"/>
+          <ac:spMkLst>
+            <pc:docMk/>
+            <pc:sldMk cId="3996105777" sldId="260"/>
+            <ac:spMk id="4" creationId="{D0225841-EDFF-4A19-90A2-2B532E29DEC9}"/>
+          </ac:spMkLst>
+        </pc:spChg>
+        <pc:spChg chg="add del">
+          <ac:chgData name="Peter Fison" userId="414d6edd842eada8" providerId="LiveId" clId="{71944941-9426-4B12-B3B2-F310EBE78256}" dt="2020-04-17T12:17:23.349" v="1095" actId="478"/>
+          <ac:spMkLst>
+            <pc:docMk/>
+            <pc:sldMk cId="3996105777" sldId="260"/>
+            <ac:spMk id="5" creationId="{27967D60-858A-4317-BDBD-4F8253D66531}"/>
+          </ac:spMkLst>
+        </pc:spChg>
+        <pc:spChg chg="add del">
+          <ac:chgData name="Peter Fison" userId="414d6edd842eada8" providerId="LiveId" clId="{71944941-9426-4B12-B3B2-F310EBE78256}" dt="2020-04-17T12:17:23.349" v="1095" actId="478"/>
+          <ac:spMkLst>
+            <pc:docMk/>
+            <pc:sldMk cId="3996105777" sldId="260"/>
+            <ac:spMk id="6" creationId="{745719D0-EC74-46A5-B048-F9EF7AF9CD7C}"/>
+          </ac:spMkLst>
+        </pc:spChg>
+        <pc:spChg chg="add del">
+          <ac:chgData name="Peter Fison" userId="414d6edd842eada8" providerId="LiveId" clId="{71944941-9426-4B12-B3B2-F310EBE78256}" dt="2020-04-17T12:17:23.349" v="1095" actId="478"/>
+          <ac:spMkLst>
+            <pc:docMk/>
+            <pc:sldMk cId="3996105777" sldId="260"/>
+            <ac:spMk id="7" creationId="{6C892D15-AB0D-45FE-B55E-C694C06A1F9E}"/>
+          </ac:spMkLst>
+        </pc:spChg>
+        <pc:spChg chg="add del">
+          <ac:chgData name="Peter Fison" userId="414d6edd842eada8" providerId="LiveId" clId="{71944941-9426-4B12-B3B2-F310EBE78256}" dt="2020-04-17T12:17:23.349" v="1095" actId="478"/>
+          <ac:spMkLst>
+            <pc:docMk/>
+            <pc:sldMk cId="3996105777" sldId="260"/>
+            <ac:spMk id="8" creationId="{B804885A-0989-41FA-998D-980A4F9744C9}"/>
+          </ac:spMkLst>
+        </pc:spChg>
+        <pc:spChg chg="add del">
+          <ac:chgData name="Peter Fison" userId="414d6edd842eada8" providerId="LiveId" clId="{71944941-9426-4B12-B3B2-F310EBE78256}" dt="2020-04-17T12:17:23.349" v="1095" actId="478"/>
+          <ac:spMkLst>
+            <pc:docMk/>
+            <pc:sldMk cId="3996105777" sldId="260"/>
+            <ac:spMk id="9" creationId="{C2862202-EC2A-445B-908B-1D90504CC729}"/>
+          </ac:spMkLst>
+        </pc:spChg>
+        <pc:spChg chg="add">
+          <ac:chgData name="Peter Fison" userId="414d6edd842eada8" providerId="LiveId" clId="{71944941-9426-4B12-B3B2-F310EBE78256}" dt="2020-04-17T12:15:48.660" v="1083"/>
+          <ac:spMkLst>
+            <pc:docMk/>
+            <pc:sldMk cId="3996105777" sldId="260"/>
+            <ac:spMk id="10" creationId="{1A60B37C-0F4A-4896-8D9B-0F7769B4BCD9}"/>
+          </ac:spMkLst>
+        </pc:spChg>
+        <pc:spChg chg="add del">
+          <ac:chgData name="Peter Fison" userId="414d6edd842eada8" providerId="LiveId" clId="{71944941-9426-4B12-B3B2-F310EBE78256}" dt="2020-04-17T12:17:28.824" v="1096" actId="478"/>
+          <ac:spMkLst>
+            <pc:docMk/>
+            <pc:sldMk cId="3996105777" sldId="260"/>
+            <ac:spMk id="11" creationId="{E601492D-76E1-494E-9D5C-BB0668D70E9D}"/>
+          </ac:spMkLst>
+        </pc:spChg>
+        <pc:spChg chg="add">
+          <ac:chgData name="Peter Fison" userId="414d6edd842eada8" providerId="LiveId" clId="{71944941-9426-4B12-B3B2-F310EBE78256}" dt="2020-04-17T12:15:48.660" v="1083"/>
+          <ac:spMkLst>
+            <pc:docMk/>
+            <pc:sldMk cId="3996105777" sldId="260"/>
+            <ac:spMk id="12" creationId="{3468D0E6-E798-4D0D-8ACF-F0B8E4D9D06F}"/>
+          </ac:spMkLst>
+        </pc:spChg>
+        <pc:spChg chg="add del">
+          <ac:chgData name="Peter Fison" userId="414d6edd842eada8" providerId="LiveId" clId="{71944941-9426-4B12-B3B2-F310EBE78256}" dt="2020-04-17T12:17:28.824" v="1096" actId="478"/>
+          <ac:spMkLst>
+            <pc:docMk/>
+            <pc:sldMk cId="3996105777" sldId="260"/>
+            <ac:spMk id="13" creationId="{6C2B390A-6563-41D3-8A0C-86996A37521F}"/>
+          </ac:spMkLst>
+        </pc:spChg>
+        <pc:spChg chg="add">
+          <ac:chgData name="Peter Fison" userId="414d6edd842eada8" providerId="LiveId" clId="{71944941-9426-4B12-B3B2-F310EBE78256}" dt="2020-04-17T12:15:48.660" v="1083"/>
+          <ac:spMkLst>
+            <pc:docMk/>
+            <pc:sldMk cId="3996105777" sldId="260"/>
+            <ac:spMk id="14" creationId="{143BAC83-E859-454C-A801-284FADAE9C4C}"/>
+          </ac:spMkLst>
+        </pc:spChg>
+        <pc:spChg chg="add">
+          <ac:chgData name="Peter Fison" userId="414d6edd842eada8" providerId="LiveId" clId="{71944941-9426-4B12-B3B2-F310EBE78256}" dt="2020-04-17T12:15:48.660" v="1083"/>
+          <ac:spMkLst>
+            <pc:docMk/>
+            <pc:sldMk cId="3996105777" sldId="260"/>
+            <ac:spMk id="15" creationId="{221A834B-15AA-4CF9-BE75-0F934A29C3D9}"/>
+          </ac:spMkLst>
+        </pc:spChg>
+      </pc:sldChg>
+      <pc:sldChg chg="addSp delSp modSp add">
+        <pc:chgData name="Peter Fison" userId="414d6edd842eada8" providerId="LiveId" clId="{71944941-9426-4B12-B3B2-F310EBE78256}" dt="2020-04-17T12:17:53.047" v="1098" actId="478"/>
+        <pc:sldMkLst>
+          <pc:docMk/>
+          <pc:sldMk cId="3299453046" sldId="261"/>
+        </pc:sldMkLst>
+        <pc:spChg chg="add mod">
+          <ac:chgData name="Peter Fison" userId="414d6edd842eada8" providerId="LiveId" clId="{71944941-9426-4B12-B3B2-F310EBE78256}" dt="2020-04-17T12:09:51.807" v="995" actId="14100"/>
+          <ac:spMkLst>
+            <pc:docMk/>
+            <pc:sldMk cId="3299453046" sldId="261"/>
+            <ac:spMk id="4" creationId="{2D2BD3A5-7CFA-4CC1-A697-8B70FCA62FA3}"/>
+          </ac:spMkLst>
+        </pc:spChg>
+        <pc:spChg chg="add del">
+          <ac:chgData name="Peter Fison" userId="414d6edd842eada8" providerId="LiveId" clId="{71944941-9426-4B12-B3B2-F310EBE78256}" dt="2020-04-17T12:17:45.300" v="1097" actId="478"/>
+          <ac:spMkLst>
+            <pc:docMk/>
+            <pc:sldMk cId="3299453046" sldId="261"/>
+            <ac:spMk id="5" creationId="{D8CD9861-87A3-4562-AA28-B94960367793}"/>
+          </ac:spMkLst>
+        </pc:spChg>
+        <pc:spChg chg="add del">
+          <ac:chgData name="Peter Fison" userId="414d6edd842eada8" providerId="LiveId" clId="{71944941-9426-4B12-B3B2-F310EBE78256}" dt="2020-04-17T12:17:45.300" v="1097" actId="478"/>
+          <ac:spMkLst>
+            <pc:docMk/>
+            <pc:sldMk cId="3299453046" sldId="261"/>
+            <ac:spMk id="6" creationId="{33945413-D123-4DE9-B1BB-F6A263B36239}"/>
+          </ac:spMkLst>
+        </pc:spChg>
+        <pc:spChg chg="add del">
+          <ac:chgData name="Peter Fison" userId="414d6edd842eada8" providerId="LiveId" clId="{71944941-9426-4B12-B3B2-F310EBE78256}" dt="2020-04-17T12:17:45.300" v="1097" actId="478"/>
+          <ac:spMkLst>
+            <pc:docMk/>
+            <pc:sldMk cId="3299453046" sldId="261"/>
+            <ac:spMk id="7" creationId="{A88322EE-41DF-43C1-9387-26904B844B2F}"/>
+          </ac:spMkLst>
+        </pc:spChg>
+        <pc:spChg chg="add del">
+          <ac:chgData name="Peter Fison" userId="414d6edd842eada8" providerId="LiveId" clId="{71944941-9426-4B12-B3B2-F310EBE78256}" dt="2020-04-17T12:17:45.300" v="1097" actId="478"/>
+          <ac:spMkLst>
+            <pc:docMk/>
+            <pc:sldMk cId="3299453046" sldId="261"/>
+            <ac:spMk id="8" creationId="{93C60875-A148-41AC-A84D-BBB684281D8E}"/>
+          </ac:spMkLst>
+        </pc:spChg>
+        <pc:spChg chg="add del">
+          <ac:chgData name="Peter Fison" userId="414d6edd842eada8" providerId="LiveId" clId="{71944941-9426-4B12-B3B2-F310EBE78256}" dt="2020-04-17T12:17:45.300" v="1097" actId="478"/>
+          <ac:spMkLst>
+            <pc:docMk/>
+            <pc:sldMk cId="3299453046" sldId="261"/>
+            <ac:spMk id="9" creationId="{3BB4562D-976B-4D73-BD49-572C6F2A58EC}"/>
+          </ac:spMkLst>
+        </pc:spChg>
+        <pc:spChg chg="add">
+          <ac:chgData name="Peter Fison" userId="414d6edd842eada8" providerId="LiveId" clId="{71944941-9426-4B12-B3B2-F310EBE78256}" dt="2020-04-17T12:15:50.042" v="1084"/>
+          <ac:spMkLst>
+            <pc:docMk/>
+            <pc:sldMk cId="3299453046" sldId="261"/>
+            <ac:spMk id="10" creationId="{43F7477E-B950-46B4-B1B8-9745ABE85BC5}"/>
+          </ac:spMkLst>
+        </pc:spChg>
+        <pc:spChg chg="add">
+          <ac:chgData name="Peter Fison" userId="414d6edd842eada8" providerId="LiveId" clId="{71944941-9426-4B12-B3B2-F310EBE78256}" dt="2020-04-17T12:15:50.042" v="1084"/>
+          <ac:spMkLst>
+            <pc:docMk/>
+            <pc:sldMk cId="3299453046" sldId="261"/>
+            <ac:spMk id="11" creationId="{29780A5C-070D-44BE-8485-1783E5F0926E}"/>
+          </ac:spMkLst>
+        </pc:spChg>
+        <pc:spChg chg="add del">
+          <ac:chgData name="Peter Fison" userId="414d6edd842eada8" providerId="LiveId" clId="{71944941-9426-4B12-B3B2-F310EBE78256}" dt="2020-04-17T12:17:53.047" v="1098" actId="478"/>
+          <ac:spMkLst>
+            <pc:docMk/>
+            <pc:sldMk cId="3299453046" sldId="261"/>
+            <ac:spMk id="12" creationId="{3FFF56F7-79EA-49AF-9741-AC0D0B724BCD}"/>
+          </ac:spMkLst>
+        </pc:spChg>
+        <pc:spChg chg="add">
+          <ac:chgData name="Peter Fison" userId="414d6edd842eada8" providerId="LiveId" clId="{71944941-9426-4B12-B3B2-F310EBE78256}" dt="2020-04-17T12:15:50.042" v="1084"/>
+          <ac:spMkLst>
+            <pc:docMk/>
+            <pc:sldMk cId="3299453046" sldId="261"/>
+            <ac:spMk id="13" creationId="{D9A4F381-43ED-4026-B2F4-D4A0B2AE94FC}"/>
+          </ac:spMkLst>
+        </pc:spChg>
+        <pc:spChg chg="add del">
+          <ac:chgData name="Peter Fison" userId="414d6edd842eada8" providerId="LiveId" clId="{71944941-9426-4B12-B3B2-F310EBE78256}" dt="2020-04-17T12:17:53.047" v="1098" actId="478"/>
+          <ac:spMkLst>
+            <pc:docMk/>
+            <pc:sldMk cId="3299453046" sldId="261"/>
+            <ac:spMk id="14" creationId="{61DCFC30-9AF4-4B65-AE00-1E087C08A9C9}"/>
+          </ac:spMkLst>
+        </pc:spChg>
+        <pc:spChg chg="add">
+          <ac:chgData name="Peter Fison" userId="414d6edd842eada8" providerId="LiveId" clId="{71944941-9426-4B12-B3B2-F310EBE78256}" dt="2020-04-17T12:15:50.042" v="1084"/>
+          <ac:spMkLst>
+            <pc:docMk/>
+            <pc:sldMk cId="3299453046" sldId="261"/>
+            <ac:spMk id="15" creationId="{7E6D4588-9650-4AFF-A58F-8F345EC9792D}"/>
+          </ac:spMkLst>
+        </pc:spChg>
+      </pc:sldChg>
+      <pc:sldChg chg="addSp delSp modSp add">
+        <pc:chgData name="Peter Fison" userId="414d6edd842eada8" providerId="LiveId" clId="{71944941-9426-4B12-B3B2-F310EBE78256}" dt="2020-04-17T12:18:56.151" v="1100" actId="478"/>
+        <pc:sldMkLst>
+          <pc:docMk/>
+          <pc:sldMk cId="3061985291" sldId="262"/>
+        </pc:sldMkLst>
+        <pc:spChg chg="add mod">
+          <ac:chgData name="Peter Fison" userId="414d6edd842eada8" providerId="LiveId" clId="{71944941-9426-4B12-B3B2-F310EBE78256}" dt="2020-04-17T12:10:05.448" v="998" actId="14100"/>
+          <ac:spMkLst>
+            <pc:docMk/>
+            <pc:sldMk cId="3061985291" sldId="262"/>
+            <ac:spMk id="4" creationId="{E678F7F8-0964-4017-90FC-4B75BECB2954}"/>
+          </ac:spMkLst>
+        </pc:spChg>
+        <pc:spChg chg="add">
+          <ac:chgData name="Peter Fison" userId="414d6edd842eada8" providerId="LiveId" clId="{71944941-9426-4B12-B3B2-F310EBE78256}" dt="2020-04-17T12:15:52.824" v="1085"/>
+          <ac:spMkLst>
+            <pc:docMk/>
+            <pc:sldMk cId="3061985291" sldId="262"/>
+            <ac:spMk id="5" creationId="{DB8AA070-477B-4ED8-84B3-4B58A40486CA}"/>
+          </ac:spMkLst>
+        </pc:spChg>
+        <pc:spChg chg="add del">
+          <ac:chgData name="Peter Fison" userId="414d6edd842eada8" providerId="LiveId" clId="{71944941-9426-4B12-B3B2-F310EBE78256}" dt="2020-04-17T12:18:42.064" v="1099" actId="478"/>
+          <ac:spMkLst>
+            <pc:docMk/>
+            <pc:sldMk cId="3061985291" sldId="262"/>
+            <ac:spMk id="6" creationId="{35D740F1-169D-42AC-BE1A-FE1485300758}"/>
+          </ac:spMkLst>
+        </pc:spChg>
+        <pc:spChg chg="add">
+          <ac:chgData name="Peter Fison" userId="414d6edd842eada8" providerId="LiveId" clId="{71944941-9426-4B12-B3B2-F310EBE78256}" dt="2020-04-17T12:15:52.824" v="1085"/>
+          <ac:spMkLst>
+            <pc:docMk/>
+            <pc:sldMk cId="3061985291" sldId="262"/>
+            <ac:spMk id="7" creationId="{833362DF-5716-471E-86B6-180CEDC81D1A}"/>
+          </ac:spMkLst>
+        </pc:spChg>
+        <pc:spChg chg="add del">
+          <ac:chgData name="Peter Fison" userId="414d6edd842eada8" providerId="LiveId" clId="{71944941-9426-4B12-B3B2-F310EBE78256}" dt="2020-04-17T12:18:42.064" v="1099" actId="478"/>
+          <ac:spMkLst>
+            <pc:docMk/>
+            <pc:sldMk cId="3061985291" sldId="262"/>
+            <ac:spMk id="8" creationId="{B3FA189A-B4A3-410B-A964-C37B2C66E4E4}"/>
+          </ac:spMkLst>
+        </pc:spChg>
+        <pc:spChg chg="add">
+          <ac:chgData name="Peter Fison" userId="414d6edd842eada8" providerId="LiveId" clId="{71944941-9426-4B12-B3B2-F310EBE78256}" dt="2020-04-17T12:15:52.824" v="1085"/>
+          <ac:spMkLst>
+            <pc:docMk/>
+            <pc:sldMk cId="3061985291" sldId="262"/>
+            <ac:spMk id="9" creationId="{CB41D032-F361-4188-99B7-E5DBB2F86A92}"/>
+          </ac:spMkLst>
+        </pc:spChg>
+        <pc:spChg chg="add del">
+          <ac:chgData name="Peter Fison" userId="414d6edd842eada8" providerId="LiveId" clId="{71944941-9426-4B12-B3B2-F310EBE78256}" dt="2020-04-17T12:18:56.151" v="1100" actId="478"/>
+          <ac:spMkLst>
+            <pc:docMk/>
+            <pc:sldMk cId="3061985291" sldId="262"/>
+            <ac:spMk id="10" creationId="{8CCF0153-C94D-41B2-A695-E10D5516CE1D}"/>
+          </ac:spMkLst>
+        </pc:spChg>
+        <pc:spChg chg="add del">
+          <ac:chgData name="Peter Fison" userId="414d6edd842eada8" providerId="LiveId" clId="{71944941-9426-4B12-B3B2-F310EBE78256}" dt="2020-04-17T12:18:56.151" v="1100" actId="478"/>
+          <ac:spMkLst>
+            <pc:docMk/>
+            <pc:sldMk cId="3061985291" sldId="262"/>
+            <ac:spMk id="11" creationId="{7BF381B5-0501-44EF-84A0-2DDA0C0BE53E}"/>
+          </ac:spMkLst>
+        </pc:spChg>
+        <pc:spChg chg="add del">
+          <ac:chgData name="Peter Fison" userId="414d6edd842eada8" providerId="LiveId" clId="{71944941-9426-4B12-B3B2-F310EBE78256}" dt="2020-04-17T12:18:56.151" v="1100" actId="478"/>
+          <ac:spMkLst>
+            <pc:docMk/>
+            <pc:sldMk cId="3061985291" sldId="262"/>
+            <ac:spMk id="12" creationId="{C0EE50BE-4200-4406-8FA2-BD0A25D7A5CB}"/>
+          </ac:spMkLst>
+        </pc:spChg>
+        <pc:spChg chg="add del">
+          <ac:chgData name="Peter Fison" userId="414d6edd842eada8" providerId="LiveId" clId="{71944941-9426-4B12-B3B2-F310EBE78256}" dt="2020-04-17T12:18:56.151" v="1100" actId="478"/>
+          <ac:spMkLst>
+            <pc:docMk/>
+            <pc:sldMk cId="3061985291" sldId="262"/>
+            <ac:spMk id="13" creationId="{DD2AAAAB-1F46-4A0E-A10D-FFA91351F449}"/>
+          </ac:spMkLst>
+        </pc:spChg>
+        <pc:spChg chg="add del">
+          <ac:chgData name="Peter Fison" userId="414d6edd842eada8" providerId="LiveId" clId="{71944941-9426-4B12-B3B2-F310EBE78256}" dt="2020-04-17T12:18:56.151" v="1100" actId="478"/>
+          <ac:spMkLst>
+            <pc:docMk/>
+            <pc:sldMk cId="3061985291" sldId="262"/>
+            <ac:spMk id="14" creationId="{2AD102F5-F44D-4BB9-8205-334FE36F0B0E}"/>
+          </ac:spMkLst>
+        </pc:spChg>
+        <pc:spChg chg="add">
+          <ac:chgData name="Peter Fison" userId="414d6edd842eada8" providerId="LiveId" clId="{71944941-9426-4B12-B3B2-F310EBE78256}" dt="2020-04-17T12:15:52.824" v="1085"/>
+          <ac:spMkLst>
+            <pc:docMk/>
+            <pc:sldMk cId="3061985291" sldId="262"/>
+            <ac:spMk id="15" creationId="{FDB35353-F1E9-4AEB-A69B-0997D906DA7B}"/>
+          </ac:spMkLst>
+        </pc:spChg>
+      </pc:sldChg>
+      <pc:sldChg chg="delSp add">
+        <pc:chgData name="Peter Fison" userId="414d6edd842eada8" providerId="LiveId" clId="{71944941-9426-4B12-B3B2-F310EBE78256}" dt="2020-04-17T12:16:43.632" v="1090" actId="478"/>
+        <pc:sldMkLst>
+          <pc:docMk/>
+          <pc:sldMk cId="4233900615" sldId="263"/>
+        </pc:sldMkLst>
+        <pc:spChg chg="del">
+          <ac:chgData name="Peter Fison" userId="414d6edd842eada8" providerId="LiveId" clId="{71944941-9426-4B12-B3B2-F310EBE78256}" dt="2020-04-17T12:16:43.632" v="1090" actId="478"/>
+          <ac:spMkLst>
+            <pc:docMk/>
+            <pc:sldMk cId="4233900615" sldId="263"/>
+            <ac:spMk id="15" creationId="{271E799D-DAC3-4260-88FA-B82C7CC7CE62}"/>
+          </ac:spMkLst>
+        </pc:spChg>
+        <pc:spChg chg="del">
+          <ac:chgData name="Peter Fison" userId="414d6edd842eada8" providerId="LiveId" clId="{71944941-9426-4B12-B3B2-F310EBE78256}" dt="2020-04-17T12:16:43.632" v="1090" actId="478"/>
+          <ac:spMkLst>
+            <pc:docMk/>
+            <pc:sldMk cId="4233900615" sldId="263"/>
+            <ac:spMk id="17" creationId="{894FED59-6297-4A0B-8184-E1025053B65C}"/>
+          </ac:spMkLst>
+        </pc:spChg>
+        <pc:spChg chg="del">
+          <ac:chgData name="Peter Fison" userId="414d6edd842eada8" providerId="LiveId" clId="{71944941-9426-4B12-B3B2-F310EBE78256}" dt="2020-04-17T12:16:43.632" v="1090" actId="478"/>
+          <ac:spMkLst>
+            <pc:docMk/>
+            <pc:sldMk cId="4233900615" sldId="263"/>
+            <ac:spMk id="18" creationId="{FC120A03-F157-4622-8479-B4EF0FB4501F}"/>
+          </ac:spMkLst>
+        </pc:spChg>
+        <pc:spChg chg="del">
+          <ac:chgData name="Peter Fison" userId="414d6edd842eada8" providerId="LiveId" clId="{71944941-9426-4B12-B3B2-F310EBE78256}" dt="2020-04-17T12:16:43.632" v="1090" actId="478"/>
+          <ac:spMkLst>
+            <pc:docMk/>
+            <pc:sldMk cId="4233900615" sldId="263"/>
+            <ac:spMk id="19" creationId="{D4E62EE0-DC14-4798-8B63-FC68067FB05B}"/>
+          </ac:spMkLst>
+        </pc:spChg>
+        <pc:spChg chg="del">
+          <ac:chgData name="Peter Fison" userId="414d6edd842eada8" providerId="LiveId" clId="{71944941-9426-4B12-B3B2-F310EBE78256}" dt="2020-04-17T12:16:43.632" v="1090" actId="478"/>
+          <ac:spMkLst>
+            <pc:docMk/>
+            <pc:sldMk cId="4233900615" sldId="263"/>
+            <ac:spMk id="20" creationId="{A8BAA630-889B-4422-A0FF-85D5CE1D4EB3}"/>
+          </ac:spMkLst>
+        </pc:spChg>
+        <pc:spChg chg="del">
+          <ac:chgData name="Peter Fison" userId="414d6edd842eada8" providerId="LiveId" clId="{71944941-9426-4B12-B3B2-F310EBE78256}" dt="2020-04-17T12:16:43.632" v="1090" actId="478"/>
+          <ac:spMkLst>
+            <pc:docMk/>
+            <pc:sldMk cId="4233900615" sldId="263"/>
+            <ac:spMk id="21" creationId="{3A38C5AE-2BCA-4E20-B57E-5B0366467A68}"/>
+          </ac:spMkLst>
+        </pc:spChg>
+        <pc:spChg chg="del">
+          <ac:chgData name="Peter Fison" userId="414d6edd842eada8" providerId="LiveId" clId="{71944941-9426-4B12-B3B2-F310EBE78256}" dt="2020-04-17T12:16:43.632" v="1090" actId="478"/>
+          <ac:spMkLst>
+            <pc:docMk/>
+            <pc:sldMk cId="4233900615" sldId="263"/>
+            <ac:spMk id="22" creationId="{F4EFA36F-B9FA-43E2-ADED-5C4C306769AF}"/>
+          </ac:spMkLst>
+        </pc:spChg>
       </pc:sldChg>
     </pc:docChg>
   </pc:docChgLst>
@@ -922,7 +1594,7 @@
           <a:p>
             <a:fld id="{EC729E90-6633-4EDD-BEB0-A0997E7868B8}" type="datetimeFigureOut">
               <a:rPr lang="en-GB" smtClean="0"/>
-              <a:t>15/04/2020</a:t>
+              <a:t>17/04/2020</a:t>
             </a:fld>
             <a:endParaRPr lang="en-GB"/>
           </a:p>
@@ -1122,7 +1794,7 @@
           <a:p>
             <a:fld id="{EC729E90-6633-4EDD-BEB0-A0997E7868B8}" type="datetimeFigureOut">
               <a:rPr lang="en-GB" smtClean="0"/>
-              <a:t>15/04/2020</a:t>
+              <a:t>17/04/2020</a:t>
             </a:fld>
             <a:endParaRPr lang="en-GB"/>
           </a:p>
@@ -1332,7 +2004,7 @@
           <a:p>
             <a:fld id="{EC729E90-6633-4EDD-BEB0-A0997E7868B8}" type="datetimeFigureOut">
               <a:rPr lang="en-GB" smtClean="0"/>
-              <a:t>15/04/2020</a:t>
+              <a:t>17/04/2020</a:t>
             </a:fld>
             <a:endParaRPr lang="en-GB"/>
           </a:p>
@@ -1532,7 +2204,7 @@
           <a:p>
             <a:fld id="{EC729E90-6633-4EDD-BEB0-A0997E7868B8}" type="datetimeFigureOut">
               <a:rPr lang="en-GB" smtClean="0"/>
-              <a:t>15/04/2020</a:t>
+              <a:t>17/04/2020</a:t>
             </a:fld>
             <a:endParaRPr lang="en-GB"/>
           </a:p>
@@ -1808,7 +2480,7 @@
           <a:p>
             <a:fld id="{EC729E90-6633-4EDD-BEB0-A0997E7868B8}" type="datetimeFigureOut">
               <a:rPr lang="en-GB" smtClean="0"/>
-              <a:t>15/04/2020</a:t>
+              <a:t>17/04/2020</a:t>
             </a:fld>
             <a:endParaRPr lang="en-GB"/>
           </a:p>
@@ -2076,7 +2748,7 @@
           <a:p>
             <a:fld id="{EC729E90-6633-4EDD-BEB0-A0997E7868B8}" type="datetimeFigureOut">
               <a:rPr lang="en-GB" smtClean="0"/>
-              <a:t>15/04/2020</a:t>
+              <a:t>17/04/2020</a:t>
             </a:fld>
             <a:endParaRPr lang="en-GB"/>
           </a:p>
@@ -2491,7 +3163,7 @@
           <a:p>
             <a:fld id="{EC729E90-6633-4EDD-BEB0-A0997E7868B8}" type="datetimeFigureOut">
               <a:rPr lang="en-GB" smtClean="0"/>
-              <a:t>15/04/2020</a:t>
+              <a:t>17/04/2020</a:t>
             </a:fld>
             <a:endParaRPr lang="en-GB"/>
           </a:p>
@@ -2633,7 +3305,7 @@
           <a:p>
             <a:fld id="{EC729E90-6633-4EDD-BEB0-A0997E7868B8}" type="datetimeFigureOut">
               <a:rPr lang="en-GB" smtClean="0"/>
-              <a:t>15/04/2020</a:t>
+              <a:t>17/04/2020</a:t>
             </a:fld>
             <a:endParaRPr lang="en-GB"/>
           </a:p>
@@ -2746,7 +3418,7 @@
           <a:p>
             <a:fld id="{EC729E90-6633-4EDD-BEB0-A0997E7868B8}" type="datetimeFigureOut">
               <a:rPr lang="en-GB" smtClean="0"/>
-              <a:t>15/04/2020</a:t>
+              <a:t>17/04/2020</a:t>
             </a:fld>
             <a:endParaRPr lang="en-GB"/>
           </a:p>
@@ -3059,7 +3731,7 @@
           <a:p>
             <a:fld id="{EC729E90-6633-4EDD-BEB0-A0997E7868B8}" type="datetimeFigureOut">
               <a:rPr lang="en-GB" smtClean="0"/>
-              <a:t>15/04/2020</a:t>
+              <a:t>17/04/2020</a:t>
             </a:fld>
             <a:endParaRPr lang="en-GB"/>
           </a:p>
@@ -3348,7 +4020,7 @@
           <a:p>
             <a:fld id="{EC729E90-6633-4EDD-BEB0-A0997E7868B8}" type="datetimeFigureOut">
               <a:rPr lang="en-GB" smtClean="0"/>
-              <a:t>15/04/2020</a:t>
+              <a:t>17/04/2020</a:t>
             </a:fld>
             <a:endParaRPr lang="en-GB"/>
           </a:p>
@@ -3591,7 +4263,7 @@
           <a:p>
             <a:fld id="{EC729E90-6633-4EDD-BEB0-A0997E7868B8}" type="datetimeFigureOut">
               <a:rPr lang="en-GB" smtClean="0"/>
-              <a:t>15/04/2020</a:t>
+              <a:t>17/04/2020</a:t>
             </a:fld>
             <a:endParaRPr lang="en-GB"/>
           </a:p>
@@ -10401,6 +11073,1952 @@
 </p:sld>
 </file>
 
+<file path=ppt/slides/slide3.xml><?xml version="1.0" encoding="utf-8"?>
+<p:sld xmlns:a="http://schemas.openxmlformats.org/drawingml/2006/main" xmlns:r="http://schemas.openxmlformats.org/officeDocument/2006/relationships" xmlns:p="http://schemas.openxmlformats.org/presentationml/2006/main">
+  <p:cSld>
+    <p:spTree>
+      <p:nvGrpSpPr>
+        <p:cNvPr id="1" name=""/>
+        <p:cNvGrpSpPr/>
+        <p:nvPr/>
+      </p:nvGrpSpPr>
+      <p:grpSpPr>
+        <a:xfrm>
+          <a:off x="0" y="0"/>
+          <a:ext cx="0" cy="0"/>
+          <a:chOff x="0" y="0"/>
+          <a:chExt cx="0" cy="0"/>
+        </a:xfrm>
+      </p:grpSpPr>
+      <p:pic>
+        <p:nvPicPr>
+          <p:cNvPr id="3" name="Picture 2">
+            <a:extLst>
+              <a:ext uri="{FF2B5EF4-FFF2-40B4-BE49-F238E27FC236}">
+                <a16:creationId xmlns:a16="http://schemas.microsoft.com/office/drawing/2014/main" id="{0394B81F-98EC-485E-A6B6-399C48F209EC}"/>
+              </a:ext>
+            </a:extLst>
+          </p:cNvPr>
+          <p:cNvPicPr>
+            <a:picLocks noChangeAspect="1"/>
+          </p:cNvPicPr>
+          <p:nvPr/>
+        </p:nvPicPr>
+        <p:blipFill>
+          <a:blip r:embed="rId2"/>
+          <a:stretch>
+            <a:fillRect/>
+          </a:stretch>
+        </p:blipFill>
+        <p:spPr>
+          <a:xfrm>
+            <a:off x="1968288" y="171282"/>
+            <a:ext cx="8255424" cy="6515435"/>
+          </a:xfrm>
+          <a:prstGeom prst="rect">
+            <a:avLst/>
+          </a:prstGeom>
+        </p:spPr>
+      </p:pic>
+      <p:sp>
+        <p:nvSpPr>
+          <p:cNvPr id="13" name="TextBox 12">
+            <a:extLst>
+              <a:ext uri="{FF2B5EF4-FFF2-40B4-BE49-F238E27FC236}">
+                <a16:creationId xmlns:a16="http://schemas.microsoft.com/office/drawing/2014/main" id="{4522A89F-F97B-4F6A-94B0-5FE9A1FB1D23}"/>
+              </a:ext>
+            </a:extLst>
+          </p:cNvPr>
+          <p:cNvSpPr txBox="1"/>
+          <p:nvPr/>
+        </p:nvSpPr>
+        <p:spPr>
+          <a:xfrm>
+            <a:off x="5063218" y="2146576"/>
+            <a:ext cx="418704" cy="646331"/>
+          </a:xfrm>
+          <a:prstGeom prst="rect">
+            <a:avLst/>
+          </a:prstGeom>
+          <a:noFill/>
+        </p:spPr>
+        <p:txBody>
+          <a:bodyPr wrap="none" rtlCol="0">
+            <a:spAutoFit/>
+          </a:bodyPr>
+          <a:lstStyle/>
+          <a:p>
+            <a:r>
+              <a:rPr lang="en-GB" sz="3600" b="1" dirty="0">
+                <a:solidFill>
+                  <a:srgbClr val="FF0000"/>
+                </a:solidFill>
+              </a:rPr>
+              <a:t>1</a:t>
+            </a:r>
+          </a:p>
+        </p:txBody>
+      </p:sp>
+      <p:sp>
+        <p:nvSpPr>
+          <p:cNvPr id="14" name="TextBox 13">
+            <a:extLst>
+              <a:ext uri="{FF2B5EF4-FFF2-40B4-BE49-F238E27FC236}">
+                <a16:creationId xmlns:a16="http://schemas.microsoft.com/office/drawing/2014/main" id="{5E883D05-C127-439E-BADC-7BD5BCFDA494}"/>
+              </a:ext>
+            </a:extLst>
+          </p:cNvPr>
+          <p:cNvSpPr txBox="1"/>
+          <p:nvPr/>
+        </p:nvSpPr>
+        <p:spPr>
+          <a:xfrm>
+            <a:off x="4128407" y="2942594"/>
+            <a:ext cx="418704" cy="646331"/>
+          </a:xfrm>
+          <a:prstGeom prst="rect">
+            <a:avLst/>
+          </a:prstGeom>
+          <a:noFill/>
+        </p:spPr>
+        <p:txBody>
+          <a:bodyPr wrap="none" rtlCol="0">
+            <a:spAutoFit/>
+          </a:bodyPr>
+          <a:lstStyle/>
+          <a:p>
+            <a:r>
+              <a:rPr lang="en-GB" sz="3600" b="1" dirty="0">
+                <a:solidFill>
+                  <a:srgbClr val="FF0000"/>
+                </a:solidFill>
+              </a:rPr>
+              <a:t>2</a:t>
+            </a:r>
+          </a:p>
+        </p:txBody>
+      </p:sp>
+      <p:sp>
+        <p:nvSpPr>
+          <p:cNvPr id="15" name="TextBox 14">
+            <a:extLst>
+              <a:ext uri="{FF2B5EF4-FFF2-40B4-BE49-F238E27FC236}">
+                <a16:creationId xmlns:a16="http://schemas.microsoft.com/office/drawing/2014/main" id="{271E799D-DAC3-4260-88FA-B82C7CC7CE62}"/>
+              </a:ext>
+            </a:extLst>
+          </p:cNvPr>
+          <p:cNvSpPr txBox="1"/>
+          <p:nvPr/>
+        </p:nvSpPr>
+        <p:spPr>
+          <a:xfrm>
+            <a:off x="6757355" y="2942593"/>
+            <a:ext cx="418704" cy="646331"/>
+          </a:xfrm>
+          <a:prstGeom prst="rect">
+            <a:avLst/>
+          </a:prstGeom>
+          <a:noFill/>
+        </p:spPr>
+        <p:txBody>
+          <a:bodyPr wrap="none" rtlCol="0">
+            <a:spAutoFit/>
+          </a:bodyPr>
+          <a:lstStyle/>
+          <a:p>
+            <a:r>
+              <a:rPr lang="en-GB" sz="3600" b="1" dirty="0">
+                <a:solidFill>
+                  <a:srgbClr val="FF0000"/>
+                </a:solidFill>
+              </a:rPr>
+              <a:t>3</a:t>
+            </a:r>
+          </a:p>
+        </p:txBody>
+      </p:sp>
+      <p:sp>
+        <p:nvSpPr>
+          <p:cNvPr id="16" name="TextBox 15">
+            <a:extLst>
+              <a:ext uri="{FF2B5EF4-FFF2-40B4-BE49-F238E27FC236}">
+                <a16:creationId xmlns:a16="http://schemas.microsoft.com/office/drawing/2014/main" id="{E69D983C-5372-4028-9D27-B38E2F00FA3A}"/>
+              </a:ext>
+            </a:extLst>
+          </p:cNvPr>
+          <p:cNvSpPr txBox="1"/>
+          <p:nvPr/>
+        </p:nvSpPr>
+        <p:spPr>
+          <a:xfrm>
+            <a:off x="4263118" y="3342644"/>
+            <a:ext cx="418704" cy="646331"/>
+          </a:xfrm>
+          <a:prstGeom prst="rect">
+            <a:avLst/>
+          </a:prstGeom>
+          <a:noFill/>
+        </p:spPr>
+        <p:txBody>
+          <a:bodyPr wrap="none" rtlCol="0">
+            <a:spAutoFit/>
+          </a:bodyPr>
+          <a:lstStyle/>
+          <a:p>
+            <a:r>
+              <a:rPr lang="en-GB" sz="3600" b="1" dirty="0">
+                <a:solidFill>
+                  <a:srgbClr val="FF0000"/>
+                </a:solidFill>
+              </a:rPr>
+              <a:t>4</a:t>
+            </a:r>
+          </a:p>
+        </p:txBody>
+      </p:sp>
+      <p:sp>
+        <p:nvSpPr>
+          <p:cNvPr id="17" name="TextBox 16">
+            <a:extLst>
+              <a:ext uri="{FF2B5EF4-FFF2-40B4-BE49-F238E27FC236}">
+                <a16:creationId xmlns:a16="http://schemas.microsoft.com/office/drawing/2014/main" id="{894FED59-6297-4A0B-8184-E1025053B65C}"/>
+              </a:ext>
+            </a:extLst>
+          </p:cNvPr>
+          <p:cNvSpPr txBox="1"/>
+          <p:nvPr/>
+        </p:nvSpPr>
+        <p:spPr>
+          <a:xfrm>
+            <a:off x="6892066" y="3302905"/>
+            <a:ext cx="418704" cy="646331"/>
+          </a:xfrm>
+          <a:prstGeom prst="rect">
+            <a:avLst/>
+          </a:prstGeom>
+          <a:noFill/>
+        </p:spPr>
+        <p:txBody>
+          <a:bodyPr wrap="none" rtlCol="0">
+            <a:spAutoFit/>
+          </a:bodyPr>
+          <a:lstStyle/>
+          <a:p>
+            <a:r>
+              <a:rPr lang="en-GB" sz="3600" b="1" dirty="0">
+                <a:solidFill>
+                  <a:srgbClr val="FF0000"/>
+                </a:solidFill>
+              </a:rPr>
+              <a:t>5</a:t>
+            </a:r>
+          </a:p>
+        </p:txBody>
+      </p:sp>
+      <p:sp>
+        <p:nvSpPr>
+          <p:cNvPr id="18" name="TextBox 17">
+            <a:extLst>
+              <a:ext uri="{FF2B5EF4-FFF2-40B4-BE49-F238E27FC236}">
+                <a16:creationId xmlns:a16="http://schemas.microsoft.com/office/drawing/2014/main" id="{FC120A03-F157-4622-8479-B4EF0FB4501F}"/>
+              </a:ext>
+            </a:extLst>
+          </p:cNvPr>
+          <p:cNvSpPr txBox="1"/>
+          <p:nvPr/>
+        </p:nvSpPr>
+        <p:spPr>
+          <a:xfrm>
+            <a:off x="9055554" y="4077430"/>
+            <a:ext cx="418704" cy="646331"/>
+          </a:xfrm>
+          <a:prstGeom prst="rect">
+            <a:avLst/>
+          </a:prstGeom>
+          <a:noFill/>
+        </p:spPr>
+        <p:txBody>
+          <a:bodyPr wrap="none" rtlCol="0">
+            <a:spAutoFit/>
+          </a:bodyPr>
+          <a:lstStyle/>
+          <a:p>
+            <a:r>
+              <a:rPr lang="en-GB" sz="3600" b="1" dirty="0">
+                <a:solidFill>
+                  <a:srgbClr val="FF0000"/>
+                </a:solidFill>
+              </a:rPr>
+              <a:t>6</a:t>
+            </a:r>
+          </a:p>
+        </p:txBody>
+      </p:sp>
+      <p:sp>
+        <p:nvSpPr>
+          <p:cNvPr id="19" name="TextBox 18">
+            <a:extLst>
+              <a:ext uri="{FF2B5EF4-FFF2-40B4-BE49-F238E27FC236}">
+                <a16:creationId xmlns:a16="http://schemas.microsoft.com/office/drawing/2014/main" id="{D4E62EE0-DC14-4798-8B63-FC68067FB05B}"/>
+              </a:ext>
+            </a:extLst>
+          </p:cNvPr>
+          <p:cNvSpPr txBox="1"/>
+          <p:nvPr/>
+        </p:nvSpPr>
+        <p:spPr>
+          <a:xfrm>
+            <a:off x="6757355" y="4877530"/>
+            <a:ext cx="418704" cy="646331"/>
+          </a:xfrm>
+          <a:prstGeom prst="rect">
+            <a:avLst/>
+          </a:prstGeom>
+          <a:noFill/>
+        </p:spPr>
+        <p:txBody>
+          <a:bodyPr wrap="none" rtlCol="0">
+            <a:spAutoFit/>
+          </a:bodyPr>
+          <a:lstStyle/>
+          <a:p>
+            <a:r>
+              <a:rPr lang="en-GB" sz="3600" b="1" dirty="0">
+                <a:solidFill>
+                  <a:srgbClr val="FF0000"/>
+                </a:solidFill>
+              </a:rPr>
+              <a:t>7</a:t>
+            </a:r>
+          </a:p>
+        </p:txBody>
+      </p:sp>
+      <p:sp>
+        <p:nvSpPr>
+          <p:cNvPr id="20" name="TextBox 19">
+            <a:extLst>
+              <a:ext uri="{FF2B5EF4-FFF2-40B4-BE49-F238E27FC236}">
+                <a16:creationId xmlns:a16="http://schemas.microsoft.com/office/drawing/2014/main" id="{A8BAA630-889B-4422-A0FF-85D5CE1D4EB3}"/>
+              </a:ext>
+            </a:extLst>
+          </p:cNvPr>
+          <p:cNvSpPr txBox="1"/>
+          <p:nvPr/>
+        </p:nvSpPr>
+        <p:spPr>
+          <a:xfrm>
+            <a:off x="9402535" y="4877529"/>
+            <a:ext cx="418704" cy="646331"/>
+          </a:xfrm>
+          <a:prstGeom prst="rect">
+            <a:avLst/>
+          </a:prstGeom>
+          <a:noFill/>
+        </p:spPr>
+        <p:txBody>
+          <a:bodyPr wrap="none" rtlCol="0">
+            <a:spAutoFit/>
+          </a:bodyPr>
+          <a:lstStyle/>
+          <a:p>
+            <a:r>
+              <a:rPr lang="en-GB" sz="3600" b="1" dirty="0">
+                <a:solidFill>
+                  <a:srgbClr val="FF0000"/>
+                </a:solidFill>
+              </a:rPr>
+              <a:t>8</a:t>
+            </a:r>
+          </a:p>
+        </p:txBody>
+      </p:sp>
+      <p:sp>
+        <p:nvSpPr>
+          <p:cNvPr id="21" name="TextBox 20">
+            <a:extLst>
+              <a:ext uri="{FF2B5EF4-FFF2-40B4-BE49-F238E27FC236}">
+                <a16:creationId xmlns:a16="http://schemas.microsoft.com/office/drawing/2014/main" id="{3A38C5AE-2BCA-4E20-B57E-5B0366467A68}"/>
+              </a:ext>
+            </a:extLst>
+          </p:cNvPr>
+          <p:cNvSpPr txBox="1"/>
+          <p:nvPr/>
+        </p:nvSpPr>
+        <p:spPr>
+          <a:xfrm>
+            <a:off x="7055303" y="5237842"/>
+            <a:ext cx="418704" cy="646331"/>
+          </a:xfrm>
+          <a:prstGeom prst="rect">
+            <a:avLst/>
+          </a:prstGeom>
+          <a:noFill/>
+        </p:spPr>
+        <p:txBody>
+          <a:bodyPr wrap="none" rtlCol="0">
+            <a:spAutoFit/>
+          </a:bodyPr>
+          <a:lstStyle/>
+          <a:p>
+            <a:r>
+              <a:rPr lang="en-GB" sz="3600" b="1" dirty="0">
+                <a:solidFill>
+                  <a:srgbClr val="FF0000"/>
+                </a:solidFill>
+              </a:rPr>
+              <a:t>9</a:t>
+            </a:r>
+          </a:p>
+        </p:txBody>
+      </p:sp>
+      <p:sp>
+        <p:nvSpPr>
+          <p:cNvPr id="22" name="TextBox 21">
+            <a:extLst>
+              <a:ext uri="{FF2B5EF4-FFF2-40B4-BE49-F238E27FC236}">
+                <a16:creationId xmlns:a16="http://schemas.microsoft.com/office/drawing/2014/main" id="{F4EFA36F-B9FA-43E2-ADED-5C4C306769AF}"/>
+              </a:ext>
+            </a:extLst>
+          </p:cNvPr>
+          <p:cNvSpPr txBox="1"/>
+          <p:nvPr/>
+        </p:nvSpPr>
+        <p:spPr>
+          <a:xfrm>
+            <a:off x="9611887" y="5242377"/>
+            <a:ext cx="652743" cy="646331"/>
+          </a:xfrm>
+          <a:prstGeom prst="rect">
+            <a:avLst/>
+          </a:prstGeom>
+          <a:noFill/>
+        </p:spPr>
+        <p:txBody>
+          <a:bodyPr wrap="none" rtlCol="0">
+            <a:spAutoFit/>
+          </a:bodyPr>
+          <a:lstStyle/>
+          <a:p>
+            <a:r>
+              <a:rPr lang="en-GB" sz="3600" b="1" dirty="0">
+                <a:solidFill>
+                  <a:srgbClr val="FF0000"/>
+                </a:solidFill>
+              </a:rPr>
+              <a:t>10</a:t>
+            </a:r>
+          </a:p>
+        </p:txBody>
+      </p:sp>
+      <p:sp>
+        <p:nvSpPr>
+          <p:cNvPr id="23" name="TextBox 22">
+            <a:extLst>
+              <a:ext uri="{FF2B5EF4-FFF2-40B4-BE49-F238E27FC236}">
+                <a16:creationId xmlns:a16="http://schemas.microsoft.com/office/drawing/2014/main" id="{3B612F88-45AB-4651-8C38-DC3115C2832E}"/>
+              </a:ext>
+            </a:extLst>
+          </p:cNvPr>
+          <p:cNvSpPr txBox="1"/>
+          <p:nvPr/>
+        </p:nvSpPr>
+        <p:spPr>
+          <a:xfrm>
+            <a:off x="8846202" y="6040386"/>
+            <a:ext cx="652743" cy="646331"/>
+          </a:xfrm>
+          <a:prstGeom prst="rect">
+            <a:avLst/>
+          </a:prstGeom>
+          <a:noFill/>
+        </p:spPr>
+        <p:txBody>
+          <a:bodyPr wrap="none" rtlCol="0">
+            <a:spAutoFit/>
+          </a:bodyPr>
+          <a:lstStyle/>
+          <a:p>
+            <a:r>
+              <a:rPr lang="en-GB" sz="3600" b="1" dirty="0">
+                <a:solidFill>
+                  <a:srgbClr val="FF0000"/>
+                </a:solidFill>
+              </a:rPr>
+              <a:t>11</a:t>
+            </a:r>
+          </a:p>
+        </p:txBody>
+      </p:sp>
+    </p:spTree>
+    <p:extLst>
+      <p:ext uri="{BB962C8B-B14F-4D97-AF65-F5344CB8AC3E}">
+        <p14:creationId xmlns:p14="http://schemas.microsoft.com/office/powerpoint/2010/main" val="3658054417"/>
+      </p:ext>
+    </p:extLst>
+  </p:cSld>
+  <p:clrMapOvr>
+    <a:masterClrMapping/>
+  </p:clrMapOvr>
+</p:sld>
+</file>
+
+<file path=ppt/slides/slide4.xml><?xml version="1.0" encoding="utf-8"?>
+<p:sld xmlns:a="http://schemas.openxmlformats.org/drawingml/2006/main" xmlns:r="http://schemas.openxmlformats.org/officeDocument/2006/relationships" xmlns:p="http://schemas.openxmlformats.org/presentationml/2006/main">
+  <p:cSld>
+    <p:spTree>
+      <p:nvGrpSpPr>
+        <p:cNvPr id="1" name=""/>
+        <p:cNvGrpSpPr/>
+        <p:nvPr/>
+      </p:nvGrpSpPr>
+      <p:grpSpPr>
+        <a:xfrm>
+          <a:off x="0" y="0"/>
+          <a:ext cx="0" cy="0"/>
+          <a:chOff x="0" y="0"/>
+          <a:chExt cx="0" cy="0"/>
+        </a:xfrm>
+      </p:grpSpPr>
+      <p:pic>
+        <p:nvPicPr>
+          <p:cNvPr id="3" name="Picture 2">
+            <a:extLst>
+              <a:ext uri="{FF2B5EF4-FFF2-40B4-BE49-F238E27FC236}">
+                <a16:creationId xmlns:a16="http://schemas.microsoft.com/office/drawing/2014/main" id="{0394B81F-98EC-485E-A6B6-399C48F209EC}"/>
+              </a:ext>
+            </a:extLst>
+          </p:cNvPr>
+          <p:cNvPicPr>
+            <a:picLocks noChangeAspect="1"/>
+          </p:cNvPicPr>
+          <p:nvPr/>
+        </p:nvPicPr>
+        <p:blipFill>
+          <a:blip r:embed="rId2"/>
+          <a:stretch>
+            <a:fillRect/>
+          </a:stretch>
+        </p:blipFill>
+        <p:spPr>
+          <a:xfrm>
+            <a:off x="1968288" y="171282"/>
+            <a:ext cx="8255424" cy="6515435"/>
+          </a:xfrm>
+          <a:prstGeom prst="rect">
+            <a:avLst/>
+          </a:prstGeom>
+        </p:spPr>
+      </p:pic>
+      <p:sp>
+        <p:nvSpPr>
+          <p:cNvPr id="4" name="Rectangle: Rounded Corners 3">
+            <a:extLst>
+              <a:ext uri="{FF2B5EF4-FFF2-40B4-BE49-F238E27FC236}">
+                <a16:creationId xmlns:a16="http://schemas.microsoft.com/office/drawing/2014/main" id="{DEE7815F-0A17-4AC7-9053-F30002D8611A}"/>
+              </a:ext>
+            </a:extLst>
+          </p:cNvPr>
+          <p:cNvSpPr/>
+          <p:nvPr/>
+        </p:nvSpPr>
+        <p:spPr>
+          <a:xfrm>
+            <a:off x="2504661" y="304800"/>
+            <a:ext cx="1908313" cy="521252"/>
+          </a:xfrm>
+          <a:prstGeom prst="roundRect">
+            <a:avLst/>
+          </a:prstGeom>
+          <a:noFill/>
+          <a:ln w="57150">
+            <a:solidFill>
+              <a:srgbClr val="FF0000"/>
+            </a:solidFill>
+          </a:ln>
+        </p:spPr>
+        <p:style>
+          <a:lnRef idx="2">
+            <a:schemeClr val="accent1">
+              <a:shade val="50000"/>
+            </a:schemeClr>
+          </a:lnRef>
+          <a:fillRef idx="1">
+            <a:schemeClr val="accent1"/>
+          </a:fillRef>
+          <a:effectRef idx="0">
+            <a:schemeClr val="accent1"/>
+          </a:effectRef>
+          <a:fontRef idx="minor">
+            <a:schemeClr val="lt1"/>
+          </a:fontRef>
+        </p:style>
+        <p:txBody>
+          <a:bodyPr rtlCol="0" anchor="ctr"/>
+          <a:lstStyle/>
+          <a:p>
+            <a:pPr algn="ctr"/>
+            <a:endParaRPr lang="en-GB"/>
+          </a:p>
+        </p:txBody>
+      </p:sp>
+      <p:sp>
+        <p:nvSpPr>
+          <p:cNvPr id="13" name="TextBox 12">
+            <a:extLst>
+              <a:ext uri="{FF2B5EF4-FFF2-40B4-BE49-F238E27FC236}">
+                <a16:creationId xmlns:a16="http://schemas.microsoft.com/office/drawing/2014/main" id="{4522A89F-F97B-4F6A-94B0-5FE9A1FB1D23}"/>
+              </a:ext>
+            </a:extLst>
+          </p:cNvPr>
+          <p:cNvSpPr txBox="1"/>
+          <p:nvPr/>
+        </p:nvSpPr>
+        <p:spPr>
+          <a:xfrm>
+            <a:off x="5063218" y="2146576"/>
+            <a:ext cx="418704" cy="646331"/>
+          </a:xfrm>
+          <a:prstGeom prst="rect">
+            <a:avLst/>
+          </a:prstGeom>
+          <a:noFill/>
+        </p:spPr>
+        <p:txBody>
+          <a:bodyPr wrap="none" rtlCol="0">
+            <a:spAutoFit/>
+          </a:bodyPr>
+          <a:lstStyle/>
+          <a:p>
+            <a:r>
+              <a:rPr lang="en-GB" sz="3600" b="1" dirty="0">
+                <a:solidFill>
+                  <a:srgbClr val="FF0000"/>
+                </a:solidFill>
+              </a:rPr>
+              <a:t>1</a:t>
+            </a:r>
+          </a:p>
+        </p:txBody>
+      </p:sp>
+      <p:sp>
+        <p:nvSpPr>
+          <p:cNvPr id="14" name="TextBox 13">
+            <a:extLst>
+              <a:ext uri="{FF2B5EF4-FFF2-40B4-BE49-F238E27FC236}">
+                <a16:creationId xmlns:a16="http://schemas.microsoft.com/office/drawing/2014/main" id="{5E883D05-C127-439E-BADC-7BD5BCFDA494}"/>
+              </a:ext>
+            </a:extLst>
+          </p:cNvPr>
+          <p:cNvSpPr txBox="1"/>
+          <p:nvPr/>
+        </p:nvSpPr>
+        <p:spPr>
+          <a:xfrm>
+            <a:off x="4128407" y="2942594"/>
+            <a:ext cx="418704" cy="646331"/>
+          </a:xfrm>
+          <a:prstGeom prst="rect">
+            <a:avLst/>
+          </a:prstGeom>
+          <a:noFill/>
+        </p:spPr>
+        <p:txBody>
+          <a:bodyPr wrap="none" rtlCol="0">
+            <a:spAutoFit/>
+          </a:bodyPr>
+          <a:lstStyle/>
+          <a:p>
+            <a:r>
+              <a:rPr lang="en-GB" sz="3600" b="1" dirty="0">
+                <a:solidFill>
+                  <a:srgbClr val="FF0000"/>
+                </a:solidFill>
+              </a:rPr>
+              <a:t>2</a:t>
+            </a:r>
+          </a:p>
+        </p:txBody>
+      </p:sp>
+      <p:sp>
+        <p:nvSpPr>
+          <p:cNvPr id="16" name="TextBox 15">
+            <a:extLst>
+              <a:ext uri="{FF2B5EF4-FFF2-40B4-BE49-F238E27FC236}">
+                <a16:creationId xmlns:a16="http://schemas.microsoft.com/office/drawing/2014/main" id="{E69D983C-5372-4028-9D27-B38E2F00FA3A}"/>
+              </a:ext>
+            </a:extLst>
+          </p:cNvPr>
+          <p:cNvSpPr txBox="1"/>
+          <p:nvPr/>
+        </p:nvSpPr>
+        <p:spPr>
+          <a:xfrm>
+            <a:off x="4263118" y="3342644"/>
+            <a:ext cx="418704" cy="646331"/>
+          </a:xfrm>
+          <a:prstGeom prst="rect">
+            <a:avLst/>
+          </a:prstGeom>
+          <a:noFill/>
+        </p:spPr>
+        <p:txBody>
+          <a:bodyPr wrap="none" rtlCol="0">
+            <a:spAutoFit/>
+          </a:bodyPr>
+          <a:lstStyle/>
+          <a:p>
+            <a:r>
+              <a:rPr lang="en-GB" sz="3600" b="1" dirty="0">
+                <a:solidFill>
+                  <a:srgbClr val="FF0000"/>
+                </a:solidFill>
+              </a:rPr>
+              <a:t>4</a:t>
+            </a:r>
+          </a:p>
+        </p:txBody>
+      </p:sp>
+      <p:sp>
+        <p:nvSpPr>
+          <p:cNvPr id="23" name="TextBox 22">
+            <a:extLst>
+              <a:ext uri="{FF2B5EF4-FFF2-40B4-BE49-F238E27FC236}">
+                <a16:creationId xmlns:a16="http://schemas.microsoft.com/office/drawing/2014/main" id="{3B612F88-45AB-4651-8C38-DC3115C2832E}"/>
+              </a:ext>
+            </a:extLst>
+          </p:cNvPr>
+          <p:cNvSpPr txBox="1"/>
+          <p:nvPr/>
+        </p:nvSpPr>
+        <p:spPr>
+          <a:xfrm>
+            <a:off x="8846202" y="6040386"/>
+            <a:ext cx="652743" cy="646331"/>
+          </a:xfrm>
+          <a:prstGeom prst="rect">
+            <a:avLst/>
+          </a:prstGeom>
+          <a:noFill/>
+        </p:spPr>
+        <p:txBody>
+          <a:bodyPr wrap="none" rtlCol="0">
+            <a:spAutoFit/>
+          </a:bodyPr>
+          <a:lstStyle/>
+          <a:p>
+            <a:r>
+              <a:rPr lang="en-GB" sz="3600" b="1" dirty="0">
+                <a:solidFill>
+                  <a:srgbClr val="FF0000"/>
+                </a:solidFill>
+              </a:rPr>
+              <a:t>11</a:t>
+            </a:r>
+          </a:p>
+        </p:txBody>
+      </p:sp>
+    </p:spTree>
+    <p:extLst>
+      <p:ext uri="{BB962C8B-B14F-4D97-AF65-F5344CB8AC3E}">
+        <p14:creationId xmlns:p14="http://schemas.microsoft.com/office/powerpoint/2010/main" val="4233900615"/>
+      </p:ext>
+    </p:extLst>
+  </p:cSld>
+  <p:clrMapOvr>
+    <a:masterClrMapping/>
+  </p:clrMapOvr>
+</p:sld>
+</file>
+
+<file path=ppt/slides/slide5.xml><?xml version="1.0" encoding="utf-8"?>
+<p:sld xmlns:a="http://schemas.openxmlformats.org/drawingml/2006/main" xmlns:r="http://schemas.openxmlformats.org/officeDocument/2006/relationships" xmlns:p="http://schemas.openxmlformats.org/presentationml/2006/main">
+  <p:cSld>
+    <p:spTree>
+      <p:nvGrpSpPr>
+        <p:cNvPr id="1" name=""/>
+        <p:cNvGrpSpPr/>
+        <p:nvPr/>
+      </p:nvGrpSpPr>
+      <p:grpSpPr>
+        <a:xfrm>
+          <a:off x="0" y="0"/>
+          <a:ext cx="0" cy="0"/>
+          <a:chOff x="0" y="0"/>
+          <a:chExt cx="0" cy="0"/>
+        </a:xfrm>
+      </p:grpSpPr>
+      <p:pic>
+        <p:nvPicPr>
+          <p:cNvPr id="3" name="Picture 2">
+            <a:extLst>
+              <a:ext uri="{FF2B5EF4-FFF2-40B4-BE49-F238E27FC236}">
+                <a16:creationId xmlns:a16="http://schemas.microsoft.com/office/drawing/2014/main" id="{0394B81F-98EC-485E-A6B6-399C48F209EC}"/>
+              </a:ext>
+            </a:extLst>
+          </p:cNvPr>
+          <p:cNvPicPr>
+            <a:picLocks noChangeAspect="1"/>
+          </p:cNvPicPr>
+          <p:nvPr/>
+        </p:nvPicPr>
+        <p:blipFill>
+          <a:blip r:embed="rId2"/>
+          <a:stretch>
+            <a:fillRect/>
+          </a:stretch>
+        </p:blipFill>
+        <p:spPr>
+          <a:xfrm>
+            <a:off x="1968288" y="171282"/>
+            <a:ext cx="8255424" cy="6515435"/>
+          </a:xfrm>
+          <a:prstGeom prst="rect">
+            <a:avLst/>
+          </a:prstGeom>
+        </p:spPr>
+      </p:pic>
+      <p:sp>
+        <p:nvSpPr>
+          <p:cNvPr id="4" name="Rectangle: Rounded Corners 3">
+            <a:extLst>
+              <a:ext uri="{FF2B5EF4-FFF2-40B4-BE49-F238E27FC236}">
+                <a16:creationId xmlns:a16="http://schemas.microsoft.com/office/drawing/2014/main" id="{5E083F51-996D-482E-BBD5-51AB8A27351B}"/>
+              </a:ext>
+            </a:extLst>
+          </p:cNvPr>
+          <p:cNvSpPr/>
+          <p:nvPr/>
+        </p:nvSpPr>
+        <p:spPr>
+          <a:xfrm>
+            <a:off x="5141843" y="268061"/>
+            <a:ext cx="1908313" cy="521252"/>
+          </a:xfrm>
+          <a:prstGeom prst="roundRect">
+            <a:avLst/>
+          </a:prstGeom>
+          <a:noFill/>
+          <a:ln w="57150">
+            <a:solidFill>
+              <a:srgbClr val="FF0000"/>
+            </a:solidFill>
+          </a:ln>
+        </p:spPr>
+        <p:style>
+          <a:lnRef idx="2">
+            <a:schemeClr val="accent1">
+              <a:shade val="50000"/>
+            </a:schemeClr>
+          </a:lnRef>
+          <a:fillRef idx="1">
+            <a:schemeClr val="accent1"/>
+          </a:fillRef>
+          <a:effectRef idx="0">
+            <a:schemeClr val="accent1"/>
+          </a:effectRef>
+          <a:fontRef idx="minor">
+            <a:schemeClr val="lt1"/>
+          </a:fontRef>
+        </p:style>
+        <p:txBody>
+          <a:bodyPr rtlCol="0" anchor="ctr"/>
+          <a:lstStyle/>
+          <a:p>
+            <a:pPr algn="ctr"/>
+            <a:endParaRPr lang="en-GB"/>
+          </a:p>
+        </p:txBody>
+      </p:sp>
+      <p:sp>
+        <p:nvSpPr>
+          <p:cNvPr id="5" name="TextBox 4">
+            <a:extLst>
+              <a:ext uri="{FF2B5EF4-FFF2-40B4-BE49-F238E27FC236}">
+                <a16:creationId xmlns:a16="http://schemas.microsoft.com/office/drawing/2014/main" id="{0C6C8060-5863-4FFF-96C0-61B0662FD5C6}"/>
+              </a:ext>
+            </a:extLst>
+          </p:cNvPr>
+          <p:cNvSpPr txBox="1"/>
+          <p:nvPr/>
+        </p:nvSpPr>
+        <p:spPr>
+          <a:xfrm>
+            <a:off x="5063218" y="2146576"/>
+            <a:ext cx="418704" cy="646331"/>
+          </a:xfrm>
+          <a:prstGeom prst="rect">
+            <a:avLst/>
+          </a:prstGeom>
+          <a:noFill/>
+        </p:spPr>
+        <p:txBody>
+          <a:bodyPr wrap="none" rtlCol="0">
+            <a:spAutoFit/>
+          </a:bodyPr>
+          <a:lstStyle/>
+          <a:p>
+            <a:r>
+              <a:rPr lang="en-GB" sz="3600" b="1" dirty="0">
+                <a:solidFill>
+                  <a:srgbClr val="FF0000"/>
+                </a:solidFill>
+              </a:rPr>
+              <a:t>1</a:t>
+            </a:r>
+          </a:p>
+        </p:txBody>
+      </p:sp>
+      <p:sp>
+        <p:nvSpPr>
+          <p:cNvPr id="7" name="TextBox 6">
+            <a:extLst>
+              <a:ext uri="{FF2B5EF4-FFF2-40B4-BE49-F238E27FC236}">
+                <a16:creationId xmlns:a16="http://schemas.microsoft.com/office/drawing/2014/main" id="{1A13DBBF-720D-412A-83E9-C17BCF36689E}"/>
+              </a:ext>
+            </a:extLst>
+          </p:cNvPr>
+          <p:cNvSpPr txBox="1"/>
+          <p:nvPr/>
+        </p:nvSpPr>
+        <p:spPr>
+          <a:xfrm>
+            <a:off x="6757355" y="2942593"/>
+            <a:ext cx="418704" cy="646331"/>
+          </a:xfrm>
+          <a:prstGeom prst="rect">
+            <a:avLst/>
+          </a:prstGeom>
+          <a:noFill/>
+        </p:spPr>
+        <p:txBody>
+          <a:bodyPr wrap="none" rtlCol="0">
+            <a:spAutoFit/>
+          </a:bodyPr>
+          <a:lstStyle/>
+          <a:p>
+            <a:r>
+              <a:rPr lang="en-GB" sz="3600" b="1" dirty="0">
+                <a:solidFill>
+                  <a:srgbClr val="FF0000"/>
+                </a:solidFill>
+              </a:rPr>
+              <a:t>3</a:t>
+            </a:r>
+          </a:p>
+        </p:txBody>
+      </p:sp>
+      <p:sp>
+        <p:nvSpPr>
+          <p:cNvPr id="9" name="TextBox 8">
+            <a:extLst>
+              <a:ext uri="{FF2B5EF4-FFF2-40B4-BE49-F238E27FC236}">
+                <a16:creationId xmlns:a16="http://schemas.microsoft.com/office/drawing/2014/main" id="{D2793308-9795-443B-BF40-D0EEC65BB88C}"/>
+              </a:ext>
+            </a:extLst>
+          </p:cNvPr>
+          <p:cNvSpPr txBox="1"/>
+          <p:nvPr/>
+        </p:nvSpPr>
+        <p:spPr>
+          <a:xfrm>
+            <a:off x="6892066" y="3302905"/>
+            <a:ext cx="418704" cy="646331"/>
+          </a:xfrm>
+          <a:prstGeom prst="rect">
+            <a:avLst/>
+          </a:prstGeom>
+          <a:noFill/>
+        </p:spPr>
+        <p:txBody>
+          <a:bodyPr wrap="none" rtlCol="0">
+            <a:spAutoFit/>
+          </a:bodyPr>
+          <a:lstStyle/>
+          <a:p>
+            <a:r>
+              <a:rPr lang="en-GB" sz="3600" b="1" dirty="0">
+                <a:solidFill>
+                  <a:srgbClr val="FF0000"/>
+                </a:solidFill>
+              </a:rPr>
+              <a:t>5</a:t>
+            </a:r>
+          </a:p>
+        </p:txBody>
+      </p:sp>
+      <p:sp>
+        <p:nvSpPr>
+          <p:cNvPr id="10" name="TextBox 9">
+            <a:extLst>
+              <a:ext uri="{FF2B5EF4-FFF2-40B4-BE49-F238E27FC236}">
+                <a16:creationId xmlns:a16="http://schemas.microsoft.com/office/drawing/2014/main" id="{FAB29499-4806-4E66-9706-398EC5068AD6}"/>
+              </a:ext>
+            </a:extLst>
+          </p:cNvPr>
+          <p:cNvSpPr txBox="1"/>
+          <p:nvPr/>
+        </p:nvSpPr>
+        <p:spPr>
+          <a:xfrm>
+            <a:off x="9055554" y="4077430"/>
+            <a:ext cx="418704" cy="646331"/>
+          </a:xfrm>
+          <a:prstGeom prst="rect">
+            <a:avLst/>
+          </a:prstGeom>
+          <a:noFill/>
+        </p:spPr>
+        <p:txBody>
+          <a:bodyPr wrap="none" rtlCol="0">
+            <a:spAutoFit/>
+          </a:bodyPr>
+          <a:lstStyle/>
+          <a:p>
+            <a:r>
+              <a:rPr lang="en-GB" sz="3600" b="1" dirty="0">
+                <a:solidFill>
+                  <a:srgbClr val="FF0000"/>
+                </a:solidFill>
+              </a:rPr>
+              <a:t>6</a:t>
+            </a:r>
+          </a:p>
+        </p:txBody>
+      </p:sp>
+      <p:sp>
+        <p:nvSpPr>
+          <p:cNvPr id="11" name="TextBox 10">
+            <a:extLst>
+              <a:ext uri="{FF2B5EF4-FFF2-40B4-BE49-F238E27FC236}">
+                <a16:creationId xmlns:a16="http://schemas.microsoft.com/office/drawing/2014/main" id="{EE4743DD-936E-456C-9ED0-AC23957A23EE}"/>
+              </a:ext>
+            </a:extLst>
+          </p:cNvPr>
+          <p:cNvSpPr txBox="1"/>
+          <p:nvPr/>
+        </p:nvSpPr>
+        <p:spPr>
+          <a:xfrm>
+            <a:off x="6757355" y="4877530"/>
+            <a:ext cx="418704" cy="646331"/>
+          </a:xfrm>
+          <a:prstGeom prst="rect">
+            <a:avLst/>
+          </a:prstGeom>
+          <a:noFill/>
+        </p:spPr>
+        <p:txBody>
+          <a:bodyPr wrap="none" rtlCol="0">
+            <a:spAutoFit/>
+          </a:bodyPr>
+          <a:lstStyle/>
+          <a:p>
+            <a:r>
+              <a:rPr lang="en-GB" sz="3600" b="1" dirty="0">
+                <a:solidFill>
+                  <a:srgbClr val="FF0000"/>
+                </a:solidFill>
+              </a:rPr>
+              <a:t>7</a:t>
+            </a:r>
+          </a:p>
+        </p:txBody>
+      </p:sp>
+      <p:sp>
+        <p:nvSpPr>
+          <p:cNvPr id="13" name="TextBox 12">
+            <a:extLst>
+              <a:ext uri="{FF2B5EF4-FFF2-40B4-BE49-F238E27FC236}">
+                <a16:creationId xmlns:a16="http://schemas.microsoft.com/office/drawing/2014/main" id="{35E4BE30-89D8-4C07-AB08-C5D078EB492F}"/>
+              </a:ext>
+            </a:extLst>
+          </p:cNvPr>
+          <p:cNvSpPr txBox="1"/>
+          <p:nvPr/>
+        </p:nvSpPr>
+        <p:spPr>
+          <a:xfrm>
+            <a:off x="7055303" y="5237842"/>
+            <a:ext cx="418704" cy="646331"/>
+          </a:xfrm>
+          <a:prstGeom prst="rect">
+            <a:avLst/>
+          </a:prstGeom>
+          <a:noFill/>
+        </p:spPr>
+        <p:txBody>
+          <a:bodyPr wrap="none" rtlCol="0">
+            <a:spAutoFit/>
+          </a:bodyPr>
+          <a:lstStyle/>
+          <a:p>
+            <a:r>
+              <a:rPr lang="en-GB" sz="3600" b="1" dirty="0">
+                <a:solidFill>
+                  <a:srgbClr val="FF0000"/>
+                </a:solidFill>
+              </a:rPr>
+              <a:t>9</a:t>
+            </a:r>
+          </a:p>
+        </p:txBody>
+      </p:sp>
+      <p:sp>
+        <p:nvSpPr>
+          <p:cNvPr id="15" name="TextBox 14">
+            <a:extLst>
+              <a:ext uri="{FF2B5EF4-FFF2-40B4-BE49-F238E27FC236}">
+                <a16:creationId xmlns:a16="http://schemas.microsoft.com/office/drawing/2014/main" id="{DF0D4E4A-A370-4613-BE34-A22CE5616CE1}"/>
+              </a:ext>
+            </a:extLst>
+          </p:cNvPr>
+          <p:cNvSpPr txBox="1"/>
+          <p:nvPr/>
+        </p:nvSpPr>
+        <p:spPr>
+          <a:xfrm>
+            <a:off x="8846202" y="6040386"/>
+            <a:ext cx="652743" cy="646331"/>
+          </a:xfrm>
+          <a:prstGeom prst="rect">
+            <a:avLst/>
+          </a:prstGeom>
+          <a:noFill/>
+        </p:spPr>
+        <p:txBody>
+          <a:bodyPr wrap="none" rtlCol="0">
+            <a:spAutoFit/>
+          </a:bodyPr>
+          <a:lstStyle/>
+          <a:p>
+            <a:r>
+              <a:rPr lang="en-GB" sz="3600" b="1" dirty="0">
+                <a:solidFill>
+                  <a:srgbClr val="FF0000"/>
+                </a:solidFill>
+              </a:rPr>
+              <a:t>11</a:t>
+            </a:r>
+          </a:p>
+        </p:txBody>
+      </p:sp>
+    </p:spTree>
+    <p:extLst>
+      <p:ext uri="{BB962C8B-B14F-4D97-AF65-F5344CB8AC3E}">
+        <p14:creationId xmlns:p14="http://schemas.microsoft.com/office/powerpoint/2010/main" val="820560306"/>
+      </p:ext>
+    </p:extLst>
+  </p:cSld>
+  <p:clrMapOvr>
+    <a:masterClrMapping/>
+  </p:clrMapOvr>
+</p:sld>
+</file>
+
+<file path=ppt/slides/slide6.xml><?xml version="1.0" encoding="utf-8"?>
+<p:sld xmlns:a="http://schemas.openxmlformats.org/drawingml/2006/main" xmlns:r="http://schemas.openxmlformats.org/officeDocument/2006/relationships" xmlns:p="http://schemas.openxmlformats.org/presentationml/2006/main">
+  <p:cSld>
+    <p:spTree>
+      <p:nvGrpSpPr>
+        <p:cNvPr id="1" name=""/>
+        <p:cNvGrpSpPr/>
+        <p:nvPr/>
+      </p:nvGrpSpPr>
+      <p:grpSpPr>
+        <a:xfrm>
+          <a:off x="0" y="0"/>
+          <a:ext cx="0" cy="0"/>
+          <a:chOff x="0" y="0"/>
+          <a:chExt cx="0" cy="0"/>
+        </a:xfrm>
+      </p:grpSpPr>
+      <p:pic>
+        <p:nvPicPr>
+          <p:cNvPr id="3" name="Picture 2">
+            <a:extLst>
+              <a:ext uri="{FF2B5EF4-FFF2-40B4-BE49-F238E27FC236}">
+                <a16:creationId xmlns:a16="http://schemas.microsoft.com/office/drawing/2014/main" id="{0394B81F-98EC-485E-A6B6-399C48F209EC}"/>
+              </a:ext>
+            </a:extLst>
+          </p:cNvPr>
+          <p:cNvPicPr>
+            <a:picLocks noChangeAspect="1"/>
+          </p:cNvPicPr>
+          <p:nvPr/>
+        </p:nvPicPr>
+        <p:blipFill>
+          <a:blip r:embed="rId2"/>
+          <a:stretch>
+            <a:fillRect/>
+          </a:stretch>
+        </p:blipFill>
+        <p:spPr>
+          <a:xfrm>
+            <a:off x="1968288" y="171282"/>
+            <a:ext cx="8255424" cy="6515435"/>
+          </a:xfrm>
+          <a:prstGeom prst="rect">
+            <a:avLst/>
+          </a:prstGeom>
+        </p:spPr>
+      </p:pic>
+      <p:sp>
+        <p:nvSpPr>
+          <p:cNvPr id="4" name="Rectangle: Rounded Corners 3">
+            <a:extLst>
+              <a:ext uri="{FF2B5EF4-FFF2-40B4-BE49-F238E27FC236}">
+                <a16:creationId xmlns:a16="http://schemas.microsoft.com/office/drawing/2014/main" id="{D0225841-EDFF-4A19-90A2-2B532E29DEC9}"/>
+              </a:ext>
+            </a:extLst>
+          </p:cNvPr>
+          <p:cNvSpPr/>
+          <p:nvPr/>
+        </p:nvSpPr>
+        <p:spPr>
+          <a:xfrm>
+            <a:off x="7876761" y="296636"/>
+            <a:ext cx="1908313" cy="521252"/>
+          </a:xfrm>
+          <a:prstGeom prst="roundRect">
+            <a:avLst/>
+          </a:prstGeom>
+          <a:noFill/>
+          <a:ln w="57150">
+            <a:solidFill>
+              <a:srgbClr val="FF0000"/>
+            </a:solidFill>
+          </a:ln>
+        </p:spPr>
+        <p:style>
+          <a:lnRef idx="2">
+            <a:schemeClr val="accent1">
+              <a:shade val="50000"/>
+            </a:schemeClr>
+          </a:lnRef>
+          <a:fillRef idx="1">
+            <a:schemeClr val="accent1"/>
+          </a:fillRef>
+          <a:effectRef idx="0">
+            <a:schemeClr val="accent1"/>
+          </a:effectRef>
+          <a:fontRef idx="minor">
+            <a:schemeClr val="lt1"/>
+          </a:fontRef>
+        </p:style>
+        <p:txBody>
+          <a:bodyPr rtlCol="0" anchor="ctr"/>
+          <a:lstStyle/>
+          <a:p>
+            <a:pPr algn="ctr"/>
+            <a:endParaRPr lang="en-GB"/>
+          </a:p>
+        </p:txBody>
+      </p:sp>
+      <p:sp>
+        <p:nvSpPr>
+          <p:cNvPr id="10" name="TextBox 9">
+            <a:extLst>
+              <a:ext uri="{FF2B5EF4-FFF2-40B4-BE49-F238E27FC236}">
+                <a16:creationId xmlns:a16="http://schemas.microsoft.com/office/drawing/2014/main" id="{1A60B37C-0F4A-4896-8D9B-0F7769B4BCD9}"/>
+              </a:ext>
+            </a:extLst>
+          </p:cNvPr>
+          <p:cNvSpPr txBox="1"/>
+          <p:nvPr/>
+        </p:nvSpPr>
+        <p:spPr>
+          <a:xfrm>
+            <a:off x="9055554" y="4077430"/>
+            <a:ext cx="418704" cy="646331"/>
+          </a:xfrm>
+          <a:prstGeom prst="rect">
+            <a:avLst/>
+          </a:prstGeom>
+          <a:noFill/>
+        </p:spPr>
+        <p:txBody>
+          <a:bodyPr wrap="none" rtlCol="0">
+            <a:spAutoFit/>
+          </a:bodyPr>
+          <a:lstStyle/>
+          <a:p>
+            <a:r>
+              <a:rPr lang="en-GB" sz="3600" b="1" dirty="0">
+                <a:solidFill>
+                  <a:srgbClr val="FF0000"/>
+                </a:solidFill>
+              </a:rPr>
+              <a:t>6</a:t>
+            </a:r>
+          </a:p>
+        </p:txBody>
+      </p:sp>
+      <p:sp>
+        <p:nvSpPr>
+          <p:cNvPr id="12" name="TextBox 11">
+            <a:extLst>
+              <a:ext uri="{FF2B5EF4-FFF2-40B4-BE49-F238E27FC236}">
+                <a16:creationId xmlns:a16="http://schemas.microsoft.com/office/drawing/2014/main" id="{3468D0E6-E798-4D0D-8ACF-F0B8E4D9D06F}"/>
+              </a:ext>
+            </a:extLst>
+          </p:cNvPr>
+          <p:cNvSpPr txBox="1"/>
+          <p:nvPr/>
+        </p:nvSpPr>
+        <p:spPr>
+          <a:xfrm>
+            <a:off x="9402535" y="4877529"/>
+            <a:ext cx="418704" cy="646331"/>
+          </a:xfrm>
+          <a:prstGeom prst="rect">
+            <a:avLst/>
+          </a:prstGeom>
+          <a:noFill/>
+        </p:spPr>
+        <p:txBody>
+          <a:bodyPr wrap="none" rtlCol="0">
+            <a:spAutoFit/>
+          </a:bodyPr>
+          <a:lstStyle/>
+          <a:p>
+            <a:r>
+              <a:rPr lang="en-GB" sz="3600" b="1" dirty="0">
+                <a:solidFill>
+                  <a:srgbClr val="FF0000"/>
+                </a:solidFill>
+              </a:rPr>
+              <a:t>8</a:t>
+            </a:r>
+          </a:p>
+        </p:txBody>
+      </p:sp>
+      <p:sp>
+        <p:nvSpPr>
+          <p:cNvPr id="14" name="TextBox 13">
+            <a:extLst>
+              <a:ext uri="{FF2B5EF4-FFF2-40B4-BE49-F238E27FC236}">
+                <a16:creationId xmlns:a16="http://schemas.microsoft.com/office/drawing/2014/main" id="{143BAC83-E859-454C-A801-284FADAE9C4C}"/>
+              </a:ext>
+            </a:extLst>
+          </p:cNvPr>
+          <p:cNvSpPr txBox="1"/>
+          <p:nvPr/>
+        </p:nvSpPr>
+        <p:spPr>
+          <a:xfrm>
+            <a:off x="9611887" y="5242377"/>
+            <a:ext cx="652743" cy="646331"/>
+          </a:xfrm>
+          <a:prstGeom prst="rect">
+            <a:avLst/>
+          </a:prstGeom>
+          <a:noFill/>
+        </p:spPr>
+        <p:txBody>
+          <a:bodyPr wrap="none" rtlCol="0">
+            <a:spAutoFit/>
+          </a:bodyPr>
+          <a:lstStyle/>
+          <a:p>
+            <a:r>
+              <a:rPr lang="en-GB" sz="3600" b="1" dirty="0">
+                <a:solidFill>
+                  <a:srgbClr val="FF0000"/>
+                </a:solidFill>
+              </a:rPr>
+              <a:t>10</a:t>
+            </a:r>
+          </a:p>
+        </p:txBody>
+      </p:sp>
+      <p:sp>
+        <p:nvSpPr>
+          <p:cNvPr id="15" name="TextBox 14">
+            <a:extLst>
+              <a:ext uri="{FF2B5EF4-FFF2-40B4-BE49-F238E27FC236}">
+                <a16:creationId xmlns:a16="http://schemas.microsoft.com/office/drawing/2014/main" id="{221A834B-15AA-4CF9-BE75-0F934A29C3D9}"/>
+              </a:ext>
+            </a:extLst>
+          </p:cNvPr>
+          <p:cNvSpPr txBox="1"/>
+          <p:nvPr/>
+        </p:nvSpPr>
+        <p:spPr>
+          <a:xfrm>
+            <a:off x="8846202" y="6040386"/>
+            <a:ext cx="652743" cy="646331"/>
+          </a:xfrm>
+          <a:prstGeom prst="rect">
+            <a:avLst/>
+          </a:prstGeom>
+          <a:noFill/>
+        </p:spPr>
+        <p:txBody>
+          <a:bodyPr wrap="none" rtlCol="0">
+            <a:spAutoFit/>
+          </a:bodyPr>
+          <a:lstStyle/>
+          <a:p>
+            <a:r>
+              <a:rPr lang="en-GB" sz="3600" b="1" dirty="0">
+                <a:solidFill>
+                  <a:srgbClr val="FF0000"/>
+                </a:solidFill>
+              </a:rPr>
+              <a:t>11</a:t>
+            </a:r>
+          </a:p>
+        </p:txBody>
+      </p:sp>
+    </p:spTree>
+    <p:extLst>
+      <p:ext uri="{BB962C8B-B14F-4D97-AF65-F5344CB8AC3E}">
+        <p14:creationId xmlns:p14="http://schemas.microsoft.com/office/powerpoint/2010/main" val="3996105777"/>
+      </p:ext>
+    </p:extLst>
+  </p:cSld>
+  <p:clrMapOvr>
+    <a:masterClrMapping/>
+  </p:clrMapOvr>
+</p:sld>
+</file>
+
+<file path=ppt/slides/slide7.xml><?xml version="1.0" encoding="utf-8"?>
+<p:sld xmlns:a="http://schemas.openxmlformats.org/drawingml/2006/main" xmlns:r="http://schemas.openxmlformats.org/officeDocument/2006/relationships" xmlns:p="http://schemas.openxmlformats.org/presentationml/2006/main">
+  <p:cSld>
+    <p:spTree>
+      <p:nvGrpSpPr>
+        <p:cNvPr id="1" name=""/>
+        <p:cNvGrpSpPr/>
+        <p:nvPr/>
+      </p:nvGrpSpPr>
+      <p:grpSpPr>
+        <a:xfrm>
+          <a:off x="0" y="0"/>
+          <a:ext cx="0" cy="0"/>
+          <a:chOff x="0" y="0"/>
+          <a:chExt cx="0" cy="0"/>
+        </a:xfrm>
+      </p:grpSpPr>
+      <p:pic>
+        <p:nvPicPr>
+          <p:cNvPr id="3" name="Picture 2">
+            <a:extLst>
+              <a:ext uri="{FF2B5EF4-FFF2-40B4-BE49-F238E27FC236}">
+                <a16:creationId xmlns:a16="http://schemas.microsoft.com/office/drawing/2014/main" id="{0394B81F-98EC-485E-A6B6-399C48F209EC}"/>
+              </a:ext>
+            </a:extLst>
+          </p:cNvPr>
+          <p:cNvPicPr>
+            <a:picLocks noChangeAspect="1"/>
+          </p:cNvPicPr>
+          <p:nvPr/>
+        </p:nvPicPr>
+        <p:blipFill>
+          <a:blip r:embed="rId2"/>
+          <a:stretch>
+            <a:fillRect/>
+          </a:stretch>
+        </p:blipFill>
+        <p:spPr>
+          <a:xfrm>
+            <a:off x="1968288" y="171282"/>
+            <a:ext cx="8255424" cy="6515435"/>
+          </a:xfrm>
+          <a:prstGeom prst="rect">
+            <a:avLst/>
+          </a:prstGeom>
+        </p:spPr>
+      </p:pic>
+      <p:sp>
+        <p:nvSpPr>
+          <p:cNvPr id="4" name="Rectangle: Rounded Corners 3">
+            <a:extLst>
+              <a:ext uri="{FF2B5EF4-FFF2-40B4-BE49-F238E27FC236}">
+                <a16:creationId xmlns:a16="http://schemas.microsoft.com/office/drawing/2014/main" id="{2D2BD3A5-7CFA-4CC1-A697-8B70FCA62FA3}"/>
+              </a:ext>
+            </a:extLst>
+          </p:cNvPr>
+          <p:cNvSpPr/>
+          <p:nvPr/>
+        </p:nvSpPr>
+        <p:spPr>
+          <a:xfrm>
+            <a:off x="2504661" y="304800"/>
+            <a:ext cx="4492132" cy="521252"/>
+          </a:xfrm>
+          <a:prstGeom prst="roundRect">
+            <a:avLst/>
+          </a:prstGeom>
+          <a:noFill/>
+          <a:ln w="57150">
+            <a:solidFill>
+              <a:srgbClr val="FF0000"/>
+            </a:solidFill>
+          </a:ln>
+        </p:spPr>
+        <p:style>
+          <a:lnRef idx="2">
+            <a:schemeClr val="accent1">
+              <a:shade val="50000"/>
+            </a:schemeClr>
+          </a:lnRef>
+          <a:fillRef idx="1">
+            <a:schemeClr val="accent1"/>
+          </a:fillRef>
+          <a:effectRef idx="0">
+            <a:schemeClr val="accent1"/>
+          </a:effectRef>
+          <a:fontRef idx="minor">
+            <a:schemeClr val="lt1"/>
+          </a:fontRef>
+        </p:style>
+        <p:txBody>
+          <a:bodyPr rtlCol="0" anchor="ctr"/>
+          <a:lstStyle/>
+          <a:p>
+            <a:pPr algn="ctr"/>
+            <a:endParaRPr lang="en-GB"/>
+          </a:p>
+        </p:txBody>
+      </p:sp>
+      <p:sp>
+        <p:nvSpPr>
+          <p:cNvPr id="10" name="TextBox 9">
+            <a:extLst>
+              <a:ext uri="{FF2B5EF4-FFF2-40B4-BE49-F238E27FC236}">
+                <a16:creationId xmlns:a16="http://schemas.microsoft.com/office/drawing/2014/main" id="{43F7477E-B950-46B4-B1B8-9745ABE85BC5}"/>
+              </a:ext>
+            </a:extLst>
+          </p:cNvPr>
+          <p:cNvSpPr txBox="1"/>
+          <p:nvPr/>
+        </p:nvSpPr>
+        <p:spPr>
+          <a:xfrm>
+            <a:off x="9055554" y="4077430"/>
+            <a:ext cx="418704" cy="646331"/>
+          </a:xfrm>
+          <a:prstGeom prst="rect">
+            <a:avLst/>
+          </a:prstGeom>
+          <a:noFill/>
+        </p:spPr>
+        <p:txBody>
+          <a:bodyPr wrap="none" rtlCol="0">
+            <a:spAutoFit/>
+          </a:bodyPr>
+          <a:lstStyle/>
+          <a:p>
+            <a:r>
+              <a:rPr lang="en-GB" sz="3600" b="1" dirty="0">
+                <a:solidFill>
+                  <a:srgbClr val="FF0000"/>
+                </a:solidFill>
+              </a:rPr>
+              <a:t>6</a:t>
+            </a:r>
+          </a:p>
+        </p:txBody>
+      </p:sp>
+      <p:sp>
+        <p:nvSpPr>
+          <p:cNvPr id="11" name="TextBox 10">
+            <a:extLst>
+              <a:ext uri="{FF2B5EF4-FFF2-40B4-BE49-F238E27FC236}">
+                <a16:creationId xmlns:a16="http://schemas.microsoft.com/office/drawing/2014/main" id="{29780A5C-070D-44BE-8485-1783E5F0926E}"/>
+              </a:ext>
+            </a:extLst>
+          </p:cNvPr>
+          <p:cNvSpPr txBox="1"/>
+          <p:nvPr/>
+        </p:nvSpPr>
+        <p:spPr>
+          <a:xfrm>
+            <a:off x="6757355" y="4877530"/>
+            <a:ext cx="418704" cy="646331"/>
+          </a:xfrm>
+          <a:prstGeom prst="rect">
+            <a:avLst/>
+          </a:prstGeom>
+          <a:noFill/>
+        </p:spPr>
+        <p:txBody>
+          <a:bodyPr wrap="none" rtlCol="0">
+            <a:spAutoFit/>
+          </a:bodyPr>
+          <a:lstStyle/>
+          <a:p>
+            <a:r>
+              <a:rPr lang="en-GB" sz="3600" b="1" dirty="0">
+                <a:solidFill>
+                  <a:srgbClr val="FF0000"/>
+                </a:solidFill>
+              </a:rPr>
+              <a:t>7</a:t>
+            </a:r>
+          </a:p>
+        </p:txBody>
+      </p:sp>
+      <p:sp>
+        <p:nvSpPr>
+          <p:cNvPr id="13" name="TextBox 12">
+            <a:extLst>
+              <a:ext uri="{FF2B5EF4-FFF2-40B4-BE49-F238E27FC236}">
+                <a16:creationId xmlns:a16="http://schemas.microsoft.com/office/drawing/2014/main" id="{D9A4F381-43ED-4026-B2F4-D4A0B2AE94FC}"/>
+              </a:ext>
+            </a:extLst>
+          </p:cNvPr>
+          <p:cNvSpPr txBox="1"/>
+          <p:nvPr/>
+        </p:nvSpPr>
+        <p:spPr>
+          <a:xfrm>
+            <a:off x="7055303" y="5237842"/>
+            <a:ext cx="418704" cy="646331"/>
+          </a:xfrm>
+          <a:prstGeom prst="rect">
+            <a:avLst/>
+          </a:prstGeom>
+          <a:noFill/>
+        </p:spPr>
+        <p:txBody>
+          <a:bodyPr wrap="none" rtlCol="0">
+            <a:spAutoFit/>
+          </a:bodyPr>
+          <a:lstStyle/>
+          <a:p>
+            <a:r>
+              <a:rPr lang="en-GB" sz="3600" b="1" dirty="0">
+                <a:solidFill>
+                  <a:srgbClr val="FF0000"/>
+                </a:solidFill>
+              </a:rPr>
+              <a:t>9</a:t>
+            </a:r>
+          </a:p>
+        </p:txBody>
+      </p:sp>
+      <p:sp>
+        <p:nvSpPr>
+          <p:cNvPr id="15" name="TextBox 14">
+            <a:extLst>
+              <a:ext uri="{FF2B5EF4-FFF2-40B4-BE49-F238E27FC236}">
+                <a16:creationId xmlns:a16="http://schemas.microsoft.com/office/drawing/2014/main" id="{7E6D4588-9650-4AFF-A58F-8F345EC9792D}"/>
+              </a:ext>
+            </a:extLst>
+          </p:cNvPr>
+          <p:cNvSpPr txBox="1"/>
+          <p:nvPr/>
+        </p:nvSpPr>
+        <p:spPr>
+          <a:xfrm>
+            <a:off x="8846202" y="6040386"/>
+            <a:ext cx="652743" cy="646331"/>
+          </a:xfrm>
+          <a:prstGeom prst="rect">
+            <a:avLst/>
+          </a:prstGeom>
+          <a:noFill/>
+        </p:spPr>
+        <p:txBody>
+          <a:bodyPr wrap="none" rtlCol="0">
+            <a:spAutoFit/>
+          </a:bodyPr>
+          <a:lstStyle/>
+          <a:p>
+            <a:r>
+              <a:rPr lang="en-GB" sz="3600" b="1" dirty="0">
+                <a:solidFill>
+                  <a:srgbClr val="FF0000"/>
+                </a:solidFill>
+              </a:rPr>
+              <a:t>11</a:t>
+            </a:r>
+          </a:p>
+        </p:txBody>
+      </p:sp>
+    </p:spTree>
+    <p:extLst>
+      <p:ext uri="{BB962C8B-B14F-4D97-AF65-F5344CB8AC3E}">
+        <p14:creationId xmlns:p14="http://schemas.microsoft.com/office/powerpoint/2010/main" val="3299453046"/>
+      </p:ext>
+    </p:extLst>
+  </p:cSld>
+  <p:clrMapOvr>
+    <a:masterClrMapping/>
+  </p:clrMapOvr>
+</p:sld>
+</file>
+
+<file path=ppt/slides/slide8.xml><?xml version="1.0" encoding="utf-8"?>
+<p:sld xmlns:a="http://schemas.openxmlformats.org/drawingml/2006/main" xmlns:r="http://schemas.openxmlformats.org/officeDocument/2006/relationships" xmlns:p="http://schemas.openxmlformats.org/presentationml/2006/main">
+  <p:cSld>
+    <p:spTree>
+      <p:nvGrpSpPr>
+        <p:cNvPr id="1" name=""/>
+        <p:cNvGrpSpPr/>
+        <p:nvPr/>
+      </p:nvGrpSpPr>
+      <p:grpSpPr>
+        <a:xfrm>
+          <a:off x="0" y="0"/>
+          <a:ext cx="0" cy="0"/>
+          <a:chOff x="0" y="0"/>
+          <a:chExt cx="0" cy="0"/>
+        </a:xfrm>
+      </p:grpSpPr>
+      <p:pic>
+        <p:nvPicPr>
+          <p:cNvPr id="3" name="Picture 2">
+            <a:extLst>
+              <a:ext uri="{FF2B5EF4-FFF2-40B4-BE49-F238E27FC236}">
+                <a16:creationId xmlns:a16="http://schemas.microsoft.com/office/drawing/2014/main" id="{0394B81F-98EC-485E-A6B6-399C48F209EC}"/>
+              </a:ext>
+            </a:extLst>
+          </p:cNvPr>
+          <p:cNvPicPr>
+            <a:picLocks noChangeAspect="1"/>
+          </p:cNvPicPr>
+          <p:nvPr/>
+        </p:nvPicPr>
+        <p:blipFill>
+          <a:blip r:embed="rId2"/>
+          <a:stretch>
+            <a:fillRect/>
+          </a:stretch>
+        </p:blipFill>
+        <p:spPr>
+          <a:xfrm>
+            <a:off x="1968288" y="171282"/>
+            <a:ext cx="8255424" cy="6515435"/>
+          </a:xfrm>
+          <a:prstGeom prst="rect">
+            <a:avLst/>
+          </a:prstGeom>
+        </p:spPr>
+      </p:pic>
+      <p:sp>
+        <p:nvSpPr>
+          <p:cNvPr id="4" name="Rectangle: Rounded Corners 3">
+            <a:extLst>
+              <a:ext uri="{FF2B5EF4-FFF2-40B4-BE49-F238E27FC236}">
+                <a16:creationId xmlns:a16="http://schemas.microsoft.com/office/drawing/2014/main" id="{E678F7F8-0964-4017-90FC-4B75BECB2954}"/>
+              </a:ext>
+            </a:extLst>
+          </p:cNvPr>
+          <p:cNvSpPr/>
+          <p:nvPr/>
+        </p:nvSpPr>
+        <p:spPr>
+          <a:xfrm>
+            <a:off x="5288682" y="280307"/>
+            <a:ext cx="4471722" cy="521252"/>
+          </a:xfrm>
+          <a:prstGeom prst="roundRect">
+            <a:avLst/>
+          </a:prstGeom>
+          <a:noFill/>
+          <a:ln w="57150">
+            <a:solidFill>
+              <a:srgbClr val="FF0000"/>
+            </a:solidFill>
+          </a:ln>
+        </p:spPr>
+        <p:style>
+          <a:lnRef idx="2">
+            <a:schemeClr val="accent1">
+              <a:shade val="50000"/>
+            </a:schemeClr>
+          </a:lnRef>
+          <a:fillRef idx="1">
+            <a:schemeClr val="accent1"/>
+          </a:fillRef>
+          <a:effectRef idx="0">
+            <a:schemeClr val="accent1"/>
+          </a:effectRef>
+          <a:fontRef idx="minor">
+            <a:schemeClr val="lt1"/>
+          </a:fontRef>
+        </p:style>
+        <p:txBody>
+          <a:bodyPr rtlCol="0" anchor="ctr"/>
+          <a:lstStyle/>
+          <a:p>
+            <a:pPr algn="ctr"/>
+            <a:endParaRPr lang="en-GB"/>
+          </a:p>
+        </p:txBody>
+      </p:sp>
+      <p:sp>
+        <p:nvSpPr>
+          <p:cNvPr id="5" name="TextBox 4">
+            <a:extLst>
+              <a:ext uri="{FF2B5EF4-FFF2-40B4-BE49-F238E27FC236}">
+                <a16:creationId xmlns:a16="http://schemas.microsoft.com/office/drawing/2014/main" id="{DB8AA070-477B-4ED8-84B3-4B58A40486CA}"/>
+              </a:ext>
+            </a:extLst>
+          </p:cNvPr>
+          <p:cNvSpPr txBox="1"/>
+          <p:nvPr/>
+        </p:nvSpPr>
+        <p:spPr>
+          <a:xfrm>
+            <a:off x="5063218" y="2146576"/>
+            <a:ext cx="418704" cy="646331"/>
+          </a:xfrm>
+          <a:prstGeom prst="rect">
+            <a:avLst/>
+          </a:prstGeom>
+          <a:noFill/>
+        </p:spPr>
+        <p:txBody>
+          <a:bodyPr wrap="none" rtlCol="0">
+            <a:spAutoFit/>
+          </a:bodyPr>
+          <a:lstStyle/>
+          <a:p>
+            <a:r>
+              <a:rPr lang="en-GB" sz="3600" b="1" dirty="0">
+                <a:solidFill>
+                  <a:srgbClr val="FF0000"/>
+                </a:solidFill>
+              </a:rPr>
+              <a:t>1</a:t>
+            </a:r>
+          </a:p>
+        </p:txBody>
+      </p:sp>
+      <p:sp>
+        <p:nvSpPr>
+          <p:cNvPr id="7" name="TextBox 6">
+            <a:extLst>
+              <a:ext uri="{FF2B5EF4-FFF2-40B4-BE49-F238E27FC236}">
+                <a16:creationId xmlns:a16="http://schemas.microsoft.com/office/drawing/2014/main" id="{833362DF-5716-471E-86B6-180CEDC81D1A}"/>
+              </a:ext>
+            </a:extLst>
+          </p:cNvPr>
+          <p:cNvSpPr txBox="1"/>
+          <p:nvPr/>
+        </p:nvSpPr>
+        <p:spPr>
+          <a:xfrm>
+            <a:off x="6757355" y="2942593"/>
+            <a:ext cx="418704" cy="646331"/>
+          </a:xfrm>
+          <a:prstGeom prst="rect">
+            <a:avLst/>
+          </a:prstGeom>
+          <a:noFill/>
+        </p:spPr>
+        <p:txBody>
+          <a:bodyPr wrap="none" rtlCol="0">
+            <a:spAutoFit/>
+          </a:bodyPr>
+          <a:lstStyle/>
+          <a:p>
+            <a:r>
+              <a:rPr lang="en-GB" sz="3600" b="1" dirty="0">
+                <a:solidFill>
+                  <a:srgbClr val="FF0000"/>
+                </a:solidFill>
+              </a:rPr>
+              <a:t>3</a:t>
+            </a:r>
+          </a:p>
+        </p:txBody>
+      </p:sp>
+      <p:sp>
+        <p:nvSpPr>
+          <p:cNvPr id="9" name="TextBox 8">
+            <a:extLst>
+              <a:ext uri="{FF2B5EF4-FFF2-40B4-BE49-F238E27FC236}">
+                <a16:creationId xmlns:a16="http://schemas.microsoft.com/office/drawing/2014/main" id="{CB41D032-F361-4188-99B7-E5DBB2F86A92}"/>
+              </a:ext>
+            </a:extLst>
+          </p:cNvPr>
+          <p:cNvSpPr txBox="1"/>
+          <p:nvPr/>
+        </p:nvSpPr>
+        <p:spPr>
+          <a:xfrm>
+            <a:off x="6892066" y="3302905"/>
+            <a:ext cx="418704" cy="646331"/>
+          </a:xfrm>
+          <a:prstGeom prst="rect">
+            <a:avLst/>
+          </a:prstGeom>
+          <a:noFill/>
+        </p:spPr>
+        <p:txBody>
+          <a:bodyPr wrap="none" rtlCol="0">
+            <a:spAutoFit/>
+          </a:bodyPr>
+          <a:lstStyle/>
+          <a:p>
+            <a:r>
+              <a:rPr lang="en-GB" sz="3600" b="1" dirty="0">
+                <a:solidFill>
+                  <a:srgbClr val="FF0000"/>
+                </a:solidFill>
+              </a:rPr>
+              <a:t>5</a:t>
+            </a:r>
+          </a:p>
+        </p:txBody>
+      </p:sp>
+      <p:sp>
+        <p:nvSpPr>
+          <p:cNvPr id="15" name="TextBox 14">
+            <a:extLst>
+              <a:ext uri="{FF2B5EF4-FFF2-40B4-BE49-F238E27FC236}">
+                <a16:creationId xmlns:a16="http://schemas.microsoft.com/office/drawing/2014/main" id="{FDB35353-F1E9-4AEB-A69B-0997D906DA7B}"/>
+              </a:ext>
+            </a:extLst>
+          </p:cNvPr>
+          <p:cNvSpPr txBox="1"/>
+          <p:nvPr/>
+        </p:nvSpPr>
+        <p:spPr>
+          <a:xfrm>
+            <a:off x="8846202" y="6040386"/>
+            <a:ext cx="652743" cy="646331"/>
+          </a:xfrm>
+          <a:prstGeom prst="rect">
+            <a:avLst/>
+          </a:prstGeom>
+          <a:noFill/>
+        </p:spPr>
+        <p:txBody>
+          <a:bodyPr wrap="none" rtlCol="0">
+            <a:spAutoFit/>
+          </a:bodyPr>
+          <a:lstStyle/>
+          <a:p>
+            <a:r>
+              <a:rPr lang="en-GB" sz="3600" b="1" dirty="0">
+                <a:solidFill>
+                  <a:srgbClr val="FF0000"/>
+                </a:solidFill>
+              </a:rPr>
+              <a:t>11</a:t>
+            </a:r>
+          </a:p>
+        </p:txBody>
+      </p:sp>
+    </p:spTree>
+    <p:extLst>
+      <p:ext uri="{BB962C8B-B14F-4D97-AF65-F5344CB8AC3E}">
+        <p14:creationId xmlns:p14="http://schemas.microsoft.com/office/powerpoint/2010/main" val="3061985291"/>
+      </p:ext>
+    </p:extLst>
+  </p:cSld>
+  <p:clrMapOvr>
+    <a:masterClrMapping/>
+  </p:clrMapOvr>
+</p:sld>
+</file>
+
 <file path=ppt/theme/theme1.xml><?xml version="1.0" encoding="utf-8"?>
 <a:theme xmlns:a="http://schemas.openxmlformats.org/drawingml/2006/main" name="Office Theme">
   <a:themeElements>

</xml_diff>